<commit_message>
Dokumentacja - ostatnie poprawki
Dodane kilka slajdów do prezentacji
</commit_message>
<xml_diff>
--- a/Dokumentacja/Las Wiedzma's - prezentacja.pptx
+++ b/Dokumentacja/Las Wiedzma's - prezentacja.pptx
@@ -7,14 +7,16 @@
   <p:sldIdLst>
     <p:sldId id="265" r:id="rId2"/>
     <p:sldId id="256" r:id="rId3"/>
-    <p:sldId id="257" r:id="rId4"/>
-    <p:sldId id="258" r:id="rId5"/>
-    <p:sldId id="259" r:id="rId6"/>
-    <p:sldId id="260" r:id="rId7"/>
-    <p:sldId id="263" r:id="rId8"/>
-    <p:sldId id="261" r:id="rId9"/>
-    <p:sldId id="262" r:id="rId10"/>
-    <p:sldId id="264" r:id="rId11"/>
+    <p:sldId id="266" r:id="rId4"/>
+    <p:sldId id="257" r:id="rId5"/>
+    <p:sldId id="258" r:id="rId6"/>
+    <p:sldId id="259" r:id="rId7"/>
+    <p:sldId id="260" r:id="rId8"/>
+    <p:sldId id="263" r:id="rId9"/>
+    <p:sldId id="261" r:id="rId10"/>
+    <p:sldId id="262" r:id="rId11"/>
+    <p:sldId id="264" r:id="rId12"/>
+    <p:sldId id="267" r:id="rId13"/>
   </p:sldIdLst>
   <p:sldSz cx="12192000" cy="6858000"/>
   <p:notesSz cx="6858000" cy="9144000"/>
@@ -113,6 +115,11 @@
       </a:defRPr>
     </a:lvl9pPr>
   </p:defaultTextStyle>
+  <p:extLst>
+    <p:ext uri="{EFAFB233-063F-42B5-8137-9DF3F51BA10A}">
+      <p15:sldGuideLst xmlns:p15="http://schemas.microsoft.com/office/powerpoint/2012/main"/>
+    </p:ext>
+  </p:extLst>
 </p:presentation>
 </file>
 
@@ -7865,7 +7872,7 @@
           <a:p>
             <a:fld id="{9E4B2097-F9FB-45D7-89C1-5CCA9DACF0FE}" type="datetimeFigureOut">
               <a:rPr lang="pl-PL" smtClean="0"/>
-              <a:t>03.06.2022</a:t>
+              <a:t>09.06.2022</a:t>
             </a:fld>
             <a:endParaRPr lang="pl-PL"/>
           </a:p>
@@ -7923,6 +7930,18 @@
   <p:clrMapOvr>
     <a:masterClrMapping/>
   </p:clrMapOvr>
+  <mc:AlternateContent xmlns:mc="http://schemas.openxmlformats.org/markup-compatibility/2006">
+    <mc:Choice xmlns:p159="http://schemas.microsoft.com/office/powerpoint/2015/09/main" Requires="p159">
+      <p:transition spd="slow">
+        <p159:morph option="byObject"/>
+      </p:transition>
+    </mc:Choice>
+    <mc:Fallback>
+      <p:transition spd="slow">
+        <p:fade/>
+      </p:transition>
+    </mc:Fallback>
+  </mc:AlternateContent>
 </p:sldLayout>
 </file>
 
@@ -8177,7 +8196,7 @@
           <a:p>
             <a:fld id="{9E4B2097-F9FB-45D7-89C1-5CCA9DACF0FE}" type="datetimeFigureOut">
               <a:rPr lang="pl-PL" smtClean="0"/>
-              <a:t>03.06.2022</a:t>
+              <a:t>09.06.2022</a:t>
             </a:fld>
             <a:endParaRPr lang="pl-PL"/>
           </a:p>
@@ -8235,6 +8254,18 @@
   <p:clrMapOvr>
     <a:masterClrMapping/>
   </p:clrMapOvr>
+  <mc:AlternateContent xmlns:mc="http://schemas.openxmlformats.org/markup-compatibility/2006">
+    <mc:Choice xmlns:p159="http://schemas.microsoft.com/office/powerpoint/2015/09/main" Requires="p159">
+      <p:transition spd="slow">
+        <p159:morph option="byObject"/>
+      </p:transition>
+    </mc:Choice>
+    <mc:Fallback>
+      <p:transition spd="slow">
+        <p:fade/>
+      </p:transition>
+    </mc:Fallback>
+  </mc:AlternateContent>
 </p:sldLayout>
 </file>
 
@@ -8399,7 +8430,7 @@
           <a:p>
             <a:fld id="{9E4B2097-F9FB-45D7-89C1-5CCA9DACF0FE}" type="datetimeFigureOut">
               <a:rPr lang="pl-PL" smtClean="0"/>
-              <a:t>03.06.2022</a:t>
+              <a:t>09.06.2022</a:t>
             </a:fld>
             <a:endParaRPr lang="pl-PL"/>
           </a:p>
@@ -8457,6 +8488,18 @@
   <p:clrMapOvr>
     <a:masterClrMapping/>
   </p:clrMapOvr>
+  <mc:AlternateContent xmlns:mc="http://schemas.openxmlformats.org/markup-compatibility/2006">
+    <mc:Choice xmlns:p159="http://schemas.microsoft.com/office/powerpoint/2015/09/main" Requires="p159">
+      <p:transition spd="slow">
+        <p159:morph option="byObject"/>
+      </p:transition>
+    </mc:Choice>
+    <mc:Fallback>
+      <p:transition spd="slow">
+        <p:fade/>
+      </p:transition>
+    </mc:Fallback>
+  </mc:AlternateContent>
 </p:sldLayout>
 </file>
 
@@ -8690,7 +8733,7 @@
           <a:p>
             <a:fld id="{9E4B2097-F9FB-45D7-89C1-5CCA9DACF0FE}" type="datetimeFigureOut">
               <a:rPr lang="pl-PL" smtClean="0"/>
-              <a:t>03.06.2022</a:t>
+              <a:t>09.06.2022</a:t>
             </a:fld>
             <a:endParaRPr lang="pl-PL"/>
           </a:p>
@@ -8980,6 +9023,18 @@
   <p:clrMapOvr>
     <a:masterClrMapping/>
   </p:clrMapOvr>
+  <mc:AlternateContent xmlns:mc="http://schemas.openxmlformats.org/markup-compatibility/2006">
+    <mc:Choice xmlns:p159="http://schemas.microsoft.com/office/powerpoint/2015/09/main" Requires="p159">
+      <p:transition spd="slow">
+        <p159:morph option="byObject"/>
+      </p:transition>
+    </mc:Choice>
+    <mc:Fallback>
+      <p:transition spd="slow">
+        <p:fade/>
+      </p:transition>
+    </mc:Fallback>
+  </mc:AlternateContent>
 </p:sldLayout>
 </file>
 
@@ -9144,7 +9199,7 @@
           <a:p>
             <a:fld id="{9E4B2097-F9FB-45D7-89C1-5CCA9DACF0FE}" type="datetimeFigureOut">
               <a:rPr lang="pl-PL" smtClean="0"/>
-              <a:t>03.06.2022</a:t>
+              <a:t>09.06.2022</a:t>
             </a:fld>
             <a:endParaRPr lang="pl-PL"/>
           </a:p>
@@ -9202,6 +9257,18 @@
   <p:clrMapOvr>
     <a:masterClrMapping/>
   </p:clrMapOvr>
+  <mc:AlternateContent xmlns:mc="http://schemas.openxmlformats.org/markup-compatibility/2006">
+    <mc:Choice xmlns:p159="http://schemas.microsoft.com/office/powerpoint/2015/09/main" Requires="p159">
+      <p:transition spd="slow">
+        <p159:morph option="byObject"/>
+      </p:transition>
+    </mc:Choice>
+    <mc:Fallback>
+      <p:transition spd="slow">
+        <p:fade/>
+      </p:transition>
+    </mc:Fallback>
+  </mc:AlternateContent>
 </p:sldLayout>
 </file>
 
@@ -9720,7 +9787,7 @@
           <a:p>
             <a:fld id="{9E4B2097-F9FB-45D7-89C1-5CCA9DACF0FE}" type="datetimeFigureOut">
               <a:rPr lang="pl-PL" smtClean="0"/>
-              <a:t>03.06.2022</a:t>
+              <a:t>09.06.2022</a:t>
             </a:fld>
             <a:endParaRPr lang="pl-PL"/>
           </a:p>
@@ -9778,6 +9845,18 @@
   <p:clrMapOvr>
     <a:masterClrMapping/>
   </p:clrMapOvr>
+  <mc:AlternateContent xmlns:mc="http://schemas.openxmlformats.org/markup-compatibility/2006">
+    <mc:Choice xmlns:p159="http://schemas.microsoft.com/office/powerpoint/2015/09/main" Requires="p159">
+      <p:transition spd="slow">
+        <p159:morph option="byObject"/>
+      </p:transition>
+    </mc:Choice>
+    <mc:Fallback>
+      <p:transition spd="slow">
+        <p:fade/>
+      </p:transition>
+    </mc:Fallback>
+  </mc:AlternateContent>
 </p:sldLayout>
 </file>
 
@@ -10572,7 +10651,7 @@
           <a:p>
             <a:fld id="{9E4B2097-F9FB-45D7-89C1-5CCA9DACF0FE}" type="datetimeFigureOut">
               <a:rPr lang="pl-PL" smtClean="0"/>
-              <a:t>03.06.2022</a:t>
+              <a:t>09.06.2022</a:t>
             </a:fld>
             <a:endParaRPr lang="pl-PL"/>
           </a:p>
@@ -10630,6 +10709,18 @@
   <p:clrMapOvr>
     <a:masterClrMapping/>
   </p:clrMapOvr>
+  <mc:AlternateContent xmlns:mc="http://schemas.openxmlformats.org/markup-compatibility/2006">
+    <mc:Choice xmlns:p159="http://schemas.microsoft.com/office/powerpoint/2015/09/main" Requires="p159">
+      <p:transition spd="slow">
+        <p159:morph option="byObject"/>
+      </p:transition>
+    </mc:Choice>
+    <mc:Fallback>
+      <p:transition spd="slow">
+        <p:fade/>
+      </p:transition>
+    </mc:Fallback>
+  </mc:AlternateContent>
 </p:sldLayout>
 </file>
 
@@ -10777,7 +10868,7 @@
           <a:p>
             <a:fld id="{9E4B2097-F9FB-45D7-89C1-5CCA9DACF0FE}" type="datetimeFigureOut">
               <a:rPr lang="pl-PL" smtClean="0"/>
-              <a:t>03.06.2022</a:t>
+              <a:t>09.06.2022</a:t>
             </a:fld>
             <a:endParaRPr lang="pl-PL"/>
           </a:p>
@@ -10835,6 +10926,18 @@
   <p:clrMapOvr>
     <a:masterClrMapping/>
   </p:clrMapOvr>
+  <mc:AlternateContent xmlns:mc="http://schemas.openxmlformats.org/markup-compatibility/2006">
+    <mc:Choice xmlns:p159="http://schemas.microsoft.com/office/powerpoint/2015/09/main" Requires="p159">
+      <p:transition spd="slow">
+        <p159:morph option="byObject"/>
+      </p:transition>
+    </mc:Choice>
+    <mc:Fallback>
+      <p:transition spd="slow">
+        <p:fade/>
+      </p:transition>
+    </mc:Fallback>
+  </mc:AlternateContent>
 </p:sldLayout>
 </file>
 
@@ -10991,7 +11094,7 @@
           <a:p>
             <a:fld id="{9E4B2097-F9FB-45D7-89C1-5CCA9DACF0FE}" type="datetimeFigureOut">
               <a:rPr lang="pl-PL" smtClean="0"/>
-              <a:t>03.06.2022</a:t>
+              <a:t>09.06.2022</a:t>
             </a:fld>
             <a:endParaRPr lang="pl-PL"/>
           </a:p>
@@ -11049,6 +11152,18 @@
   <p:clrMapOvr>
     <a:masterClrMapping/>
   </p:clrMapOvr>
+  <mc:AlternateContent xmlns:mc="http://schemas.openxmlformats.org/markup-compatibility/2006">
+    <mc:Choice xmlns:p159="http://schemas.microsoft.com/office/powerpoint/2015/09/main" Requires="p159">
+      <p:transition spd="slow">
+        <p159:morph option="byObject"/>
+      </p:transition>
+    </mc:Choice>
+    <mc:Fallback>
+      <p:transition spd="slow">
+        <p:fade/>
+      </p:transition>
+    </mc:Fallback>
+  </mc:AlternateContent>
 </p:sldLayout>
 </file>
 
@@ -11177,7 +11292,7 @@
           <a:p>
             <a:fld id="{9E4B2097-F9FB-45D7-89C1-5CCA9DACF0FE}" type="datetimeFigureOut">
               <a:rPr lang="pl-PL" smtClean="0"/>
-              <a:t>03.06.2022</a:t>
+              <a:t>09.06.2022</a:t>
             </a:fld>
             <a:endParaRPr lang="pl-PL"/>
           </a:p>
@@ -11247,6 +11362,18 @@
   <p:clrMapOvr>
     <a:masterClrMapping/>
   </p:clrMapOvr>
+  <mc:AlternateContent xmlns:mc="http://schemas.openxmlformats.org/markup-compatibility/2006">
+    <mc:Choice xmlns:p159="http://schemas.microsoft.com/office/powerpoint/2015/09/main" Requires="p159">
+      <p:transition spd="slow">
+        <p159:morph option="byObject"/>
+      </p:transition>
+    </mc:Choice>
+    <mc:Fallback>
+      <p:transition spd="slow">
+        <p:fade/>
+      </p:transition>
+    </mc:Fallback>
+  </mc:AlternateContent>
 </p:sldLayout>
 </file>
 
@@ -11394,7 +11521,7 @@
           <a:p>
             <a:fld id="{9E4B2097-F9FB-45D7-89C1-5CCA9DACF0FE}" type="datetimeFigureOut">
               <a:rPr lang="pl-PL" smtClean="0"/>
-              <a:t>03.06.2022</a:t>
+              <a:t>09.06.2022</a:t>
             </a:fld>
             <a:endParaRPr lang="pl-PL"/>
           </a:p>
@@ -11452,6 +11579,18 @@
   <p:clrMapOvr>
     <a:masterClrMapping/>
   </p:clrMapOvr>
+  <mc:AlternateContent xmlns:mc="http://schemas.openxmlformats.org/markup-compatibility/2006">
+    <mc:Choice xmlns:p159="http://schemas.microsoft.com/office/powerpoint/2015/09/main" Requires="p159">
+      <p:transition spd="slow">
+        <p159:morph option="byObject"/>
+      </p:transition>
+    </mc:Choice>
+    <mc:Fallback>
+      <p:transition spd="slow">
+        <p:fade/>
+      </p:transition>
+    </mc:Fallback>
+  </mc:AlternateContent>
 </p:sldLayout>
 </file>
 
@@ -11674,7 +11813,7 @@
           <a:p>
             <a:fld id="{9E4B2097-F9FB-45D7-89C1-5CCA9DACF0FE}" type="datetimeFigureOut">
               <a:rPr lang="pl-PL" smtClean="0"/>
-              <a:t>03.06.2022</a:t>
+              <a:t>09.06.2022</a:t>
             </a:fld>
             <a:endParaRPr lang="pl-PL"/>
           </a:p>
@@ -11732,6 +11871,18 @@
   <p:clrMapOvr>
     <a:masterClrMapping/>
   </p:clrMapOvr>
+  <mc:AlternateContent xmlns:mc="http://schemas.openxmlformats.org/markup-compatibility/2006">
+    <mc:Choice xmlns:p159="http://schemas.microsoft.com/office/powerpoint/2015/09/main" Requires="p159">
+      <p:transition spd="slow">
+        <p159:morph option="byObject"/>
+      </p:transition>
+    </mc:Choice>
+    <mc:Fallback>
+      <p:transition spd="slow">
+        <p:fade/>
+      </p:transition>
+    </mc:Fallback>
+  </mc:AlternateContent>
 </p:sldLayout>
 </file>
 
@@ -11941,7 +12092,7 @@
           <a:p>
             <a:fld id="{9E4B2097-F9FB-45D7-89C1-5CCA9DACF0FE}" type="datetimeFigureOut">
               <a:rPr lang="pl-PL" smtClean="0"/>
-              <a:t>03.06.2022</a:t>
+              <a:t>09.06.2022</a:t>
             </a:fld>
             <a:endParaRPr lang="pl-PL"/>
           </a:p>
@@ -11999,6 +12150,18 @@
   <p:clrMapOvr>
     <a:masterClrMapping/>
   </p:clrMapOvr>
+  <mc:AlternateContent xmlns:mc="http://schemas.openxmlformats.org/markup-compatibility/2006">
+    <mc:Choice xmlns:p159="http://schemas.microsoft.com/office/powerpoint/2015/09/main" Requires="p159">
+      <p:transition spd="slow">
+        <p159:morph option="byObject"/>
+      </p:transition>
+    </mc:Choice>
+    <mc:Fallback>
+      <p:transition spd="slow">
+        <p:fade/>
+      </p:transition>
+    </mc:Fallback>
+  </mc:AlternateContent>
 </p:sldLayout>
 </file>
 
@@ -12356,7 +12519,7 @@
           <a:p>
             <a:fld id="{9E4B2097-F9FB-45D7-89C1-5CCA9DACF0FE}" type="datetimeFigureOut">
               <a:rPr lang="pl-PL" smtClean="0"/>
-              <a:t>03.06.2022</a:t>
+              <a:t>09.06.2022</a:t>
             </a:fld>
             <a:endParaRPr lang="pl-PL"/>
           </a:p>
@@ -12414,6 +12577,18 @@
   <p:clrMapOvr>
     <a:masterClrMapping/>
   </p:clrMapOvr>
+  <mc:AlternateContent xmlns:mc="http://schemas.openxmlformats.org/markup-compatibility/2006">
+    <mc:Choice xmlns:p159="http://schemas.microsoft.com/office/powerpoint/2015/09/main" Requires="p159">
+      <p:transition spd="slow">
+        <p159:morph option="byObject"/>
+      </p:transition>
+    </mc:Choice>
+    <mc:Fallback>
+      <p:transition spd="slow">
+        <p:fade/>
+      </p:transition>
+    </mc:Fallback>
+  </mc:AlternateContent>
 </p:sldLayout>
 </file>
 
@@ -12504,7 +12679,7 @@
           <a:p>
             <a:fld id="{9E4B2097-F9FB-45D7-89C1-5CCA9DACF0FE}" type="datetimeFigureOut">
               <a:rPr lang="pl-PL" smtClean="0"/>
-              <a:t>03.06.2022</a:t>
+              <a:t>09.06.2022</a:t>
             </a:fld>
             <a:endParaRPr lang="pl-PL"/>
           </a:p>
@@ -12562,6 +12737,18 @@
   <p:clrMapOvr>
     <a:masterClrMapping/>
   </p:clrMapOvr>
+  <mc:AlternateContent xmlns:mc="http://schemas.openxmlformats.org/markup-compatibility/2006">
+    <mc:Choice xmlns:p159="http://schemas.microsoft.com/office/powerpoint/2015/09/main" Requires="p159">
+      <p:transition spd="slow">
+        <p159:morph option="byObject"/>
+      </p:transition>
+    </mc:Choice>
+    <mc:Fallback>
+      <p:transition spd="slow">
+        <p:fade/>
+      </p:transition>
+    </mc:Fallback>
+  </mc:AlternateContent>
 </p:sldLayout>
 </file>
 
@@ -12629,7 +12816,7 @@
           <a:p>
             <a:fld id="{9E4B2097-F9FB-45D7-89C1-5CCA9DACF0FE}" type="datetimeFigureOut">
               <a:rPr lang="pl-PL" smtClean="0"/>
-              <a:t>03.06.2022</a:t>
+              <a:t>09.06.2022</a:t>
             </a:fld>
             <a:endParaRPr lang="pl-PL"/>
           </a:p>
@@ -12687,6 +12874,18 @@
   <p:clrMapOvr>
     <a:masterClrMapping/>
   </p:clrMapOvr>
+  <mc:AlternateContent xmlns:mc="http://schemas.openxmlformats.org/markup-compatibility/2006">
+    <mc:Choice xmlns:p159="http://schemas.microsoft.com/office/powerpoint/2015/09/main" Requires="p159">
+      <p:transition spd="slow">
+        <p159:morph option="byObject"/>
+      </p:transition>
+    </mc:Choice>
+    <mc:Fallback>
+      <p:transition spd="slow">
+        <p:fade/>
+      </p:transition>
+    </mc:Fallback>
+  </mc:AlternateContent>
 </p:sldLayout>
 </file>
 
@@ -12908,7 +13107,7 @@
           <a:p>
             <a:fld id="{9E4B2097-F9FB-45D7-89C1-5CCA9DACF0FE}" type="datetimeFigureOut">
               <a:rPr lang="pl-PL" smtClean="0"/>
-              <a:t>03.06.2022</a:t>
+              <a:t>09.06.2022</a:t>
             </a:fld>
             <a:endParaRPr lang="pl-PL"/>
           </a:p>
@@ -12966,6 +13165,18 @@
   <p:clrMapOvr>
     <a:masterClrMapping/>
   </p:clrMapOvr>
+  <mc:AlternateContent xmlns:mc="http://schemas.openxmlformats.org/markup-compatibility/2006">
+    <mc:Choice xmlns:p159="http://schemas.microsoft.com/office/powerpoint/2015/09/main" Requires="p159">
+      <p:transition spd="slow">
+        <p159:morph option="byObject"/>
+      </p:transition>
+    </mc:Choice>
+    <mc:Fallback>
+      <p:transition spd="slow">
+        <p:fade/>
+      </p:transition>
+    </mc:Fallback>
+  </mc:AlternateContent>
 </p:sldLayout>
 </file>
 
@@ -13220,7 +13431,7 @@
           <a:p>
             <a:fld id="{9E4B2097-F9FB-45D7-89C1-5CCA9DACF0FE}" type="datetimeFigureOut">
               <a:rPr lang="pl-PL" smtClean="0"/>
-              <a:t>03.06.2022</a:t>
+              <a:t>09.06.2022</a:t>
             </a:fld>
             <a:endParaRPr lang="pl-PL"/>
           </a:p>
@@ -13278,6 +13489,18 @@
   <p:clrMapOvr>
     <a:masterClrMapping/>
   </p:clrMapOvr>
+  <mc:AlternateContent xmlns:mc="http://schemas.openxmlformats.org/markup-compatibility/2006">
+    <mc:Choice xmlns:p159="http://schemas.microsoft.com/office/powerpoint/2015/09/main" Requires="p159">
+      <p:transition spd="slow">
+        <p159:morph option="byObject"/>
+      </p:transition>
+    </mc:Choice>
+    <mc:Fallback>
+      <p:transition spd="slow">
+        <p:fade/>
+      </p:transition>
+    </mc:Fallback>
+  </mc:AlternateContent>
 </p:sldLayout>
 </file>
 
@@ -13473,7 +13696,7 @@
           <a:p>
             <a:fld id="{9E4B2097-F9FB-45D7-89C1-5CCA9DACF0FE}" type="datetimeFigureOut">
               <a:rPr lang="pl-PL" smtClean="0"/>
-              <a:t>03.06.2022</a:t>
+              <a:t>09.06.2022</a:t>
             </a:fld>
             <a:endParaRPr lang="pl-PL"/>
           </a:p>
@@ -13581,6 +13804,18 @@
     <p:sldLayoutId id="2147483677" r:id="rId17"/>
     <p:sldLayoutId id="2147483678" r:id="rId18"/>
   </p:sldLayoutIdLst>
+  <mc:AlternateContent xmlns:mc="http://schemas.openxmlformats.org/markup-compatibility/2006">
+    <mc:Choice xmlns:p159="http://schemas.microsoft.com/office/powerpoint/2015/09/main" Requires="p159">
+      <p:transition spd="slow">
+        <p159:morph option="byObject"/>
+      </p:transition>
+    </mc:Choice>
+    <mc:Fallback>
+      <p:transition spd="slow">
+        <p:fade/>
+      </p:transition>
+    </mc:Fallback>
+  </mc:AlternateContent>
   <p:txStyles>
     <p:titleStyle>
       <a:lvl1pPr algn="ctr" defTabSz="914400" rtl="0" eaLnBrk="1" latinLnBrk="0" hangingPunct="1">
@@ -14137,10 +14372,649 @@
   <p:clrMapOvr>
     <a:masterClrMapping/>
   </p:clrMapOvr>
+  <mc:AlternateContent xmlns:mc="http://schemas.openxmlformats.org/markup-compatibility/2006">
+    <mc:Choice xmlns:p159="http://schemas.microsoft.com/office/powerpoint/2015/09/main" Requires="p159">
+      <p:transition spd="slow">
+        <p159:morph option="byObject"/>
+      </p:transition>
+    </mc:Choice>
+    <mc:Fallback>
+      <p:transition spd="slow">
+        <p:fade/>
+      </p:transition>
+    </mc:Fallback>
+  </mc:AlternateContent>
 </p:sld>
 </file>
 
 <file path=ppt/slides/slide10.xml><?xml version="1.0" encoding="utf-8"?>
+<p:sld xmlns:a="http://schemas.openxmlformats.org/drawingml/2006/main" xmlns:r="http://schemas.openxmlformats.org/officeDocument/2006/relationships" xmlns:p="http://schemas.openxmlformats.org/presentationml/2006/main">
+  <p:cSld>
+    <p:spTree>
+      <p:nvGrpSpPr>
+        <p:cNvPr id="1" name=""/>
+        <p:cNvGrpSpPr/>
+        <p:nvPr/>
+      </p:nvGrpSpPr>
+      <p:grpSpPr>
+        <a:xfrm>
+          <a:off x="0" y="0"/>
+          <a:ext cx="0" cy="0"/>
+          <a:chOff x="0" y="0"/>
+          <a:chExt cx="0" cy="0"/>
+        </a:xfrm>
+      </p:grpSpPr>
+      <p:sp>
+        <p:nvSpPr>
+          <p:cNvPr id="2" name="Tytuł 1">
+            <a:extLst>
+              <a:ext uri="{FF2B5EF4-FFF2-40B4-BE49-F238E27FC236}">
+                <a16:creationId xmlns:a16="http://schemas.microsoft.com/office/drawing/2014/main" id="{F4ABE5A0-312E-D7EE-FBF2-46D9B8377363}"/>
+              </a:ext>
+            </a:extLst>
+          </p:cNvPr>
+          <p:cNvSpPr>
+            <a:spLocks noGrp="1"/>
+          </p:cNvSpPr>
+          <p:nvPr>
+            <p:ph type="title"/>
+          </p:nvPr>
+        </p:nvSpPr>
+        <p:spPr>
+          <a:xfrm>
+            <a:off x="913773" y="250379"/>
+            <a:ext cx="10364451" cy="1596177"/>
+          </a:xfrm>
+        </p:spPr>
+        <p:txBody>
+          <a:bodyPr/>
+          <a:lstStyle/>
+          <a:p>
+            <a:r>
+              <a:rPr lang="pl-PL" dirty="0"/>
+              <a:t>Wariant zbilansowany – ustawienia domyślne</a:t>
+            </a:r>
+          </a:p>
+        </p:txBody>
+      </p:sp>
+      <p:graphicFrame>
+        <p:nvGraphicFramePr>
+          <p:cNvPr id="4" name="Tabela 3">
+            <a:extLst>
+              <a:ext uri="{FF2B5EF4-FFF2-40B4-BE49-F238E27FC236}">
+                <a16:creationId xmlns:a16="http://schemas.microsoft.com/office/drawing/2014/main" id="{A0C88312-C6A3-30F5-4652-648EF21CB3C4}"/>
+              </a:ext>
+            </a:extLst>
+          </p:cNvPr>
+          <p:cNvGraphicFramePr>
+            <a:graphicFrameLocks noGrp="1"/>
+          </p:cNvGraphicFramePr>
+          <p:nvPr>
+            <p:extLst>
+              <p:ext uri="{D42A27DB-BD31-4B8C-83A1-F6EECF244321}">
+                <p14:modId xmlns:p14="http://schemas.microsoft.com/office/powerpoint/2010/main" val="3384900101"/>
+              </p:ext>
+            </p:extLst>
+          </p:nvPr>
+        </p:nvGraphicFramePr>
+        <p:xfrm>
+          <a:off x="3348134" y="1690688"/>
+          <a:ext cx="5495731" cy="4916933"/>
+        </p:xfrm>
+        <a:graphic>
+          <a:graphicData uri="http://schemas.openxmlformats.org/drawingml/2006/table">
+            <a:tbl>
+              <a:tblPr>
+                <a:tableStyleId>{616DA210-FB5B-4158-B5E0-FEB733F419BA}</a:tableStyleId>
+              </a:tblPr>
+              <a:tblGrid>
+                <a:gridCol w="4307464">
+                  <a:extLst>
+                    <a:ext uri="{9D8B030D-6E8A-4147-A177-3AD203B41FA5}">
+                      <a16:colId xmlns:a16="http://schemas.microsoft.com/office/drawing/2014/main" val="4184483721"/>
+                    </a:ext>
+                  </a:extLst>
+                </a:gridCol>
+                <a:gridCol w="1188267">
+                  <a:extLst>
+                    <a:ext uri="{9D8B030D-6E8A-4147-A177-3AD203B41FA5}">
+                      <a16:colId xmlns:a16="http://schemas.microsoft.com/office/drawing/2014/main" val="325871312"/>
+                    </a:ext>
+                  </a:extLst>
+                </a:gridCol>
+              </a:tblGrid>
+              <a:tr h="461424">
+                <a:tc gridSpan="2">
+                  <a:txBody>
+                    <a:bodyPr/>
+                    <a:lstStyle/>
+                    <a:p>
+                      <a:pPr algn="ctr" fontAlgn="b"/>
+                      <a:r>
+                        <a:rPr lang="pl-PL" sz="2400" u="none" strike="noStrike" dirty="0">
+                          <a:effectLst/>
+                        </a:rPr>
+                        <a:t>Ustawienia</a:t>
+                      </a:r>
+                      <a:endParaRPr lang="pl-PL" sz="2400" b="0" i="0" u="none" strike="noStrike" dirty="0">
+                        <a:solidFill>
+                          <a:srgbClr val="000000"/>
+                        </a:solidFill>
+                        <a:effectLst/>
+                        <a:latin typeface="Calibri" panose="020F0502020204030204" pitchFamily="34" charset="0"/>
+                      </a:endParaRPr>
+                    </a:p>
+                  </a:txBody>
+                  <a:tcPr marL="9525" marR="9525" marT="9525" marB="0" anchor="b"/>
+                </a:tc>
+                <a:tc hMerge="1">
+                  <a:txBody>
+                    <a:bodyPr/>
+                    <a:lstStyle/>
+                    <a:p>
+                      <a:endParaRPr lang="pl-PL"/>
+                    </a:p>
+                  </a:txBody>
+                  <a:tcPr/>
+                </a:tc>
+                <a:extLst>
+                  <a:ext uri="{0D108BD9-81ED-4DB2-BD59-A6C34878D82A}">
+                    <a16:rowId xmlns:a16="http://schemas.microsoft.com/office/drawing/2014/main" val="1249242128"/>
+                  </a:ext>
+                </a:extLst>
+              </a:tr>
+              <a:tr h="461424">
+                <a:tc>
+                  <a:txBody>
+                    <a:bodyPr/>
+                    <a:lstStyle/>
+                    <a:p>
+                      <a:pPr algn="l" fontAlgn="b"/>
+                      <a:r>
+                        <a:rPr lang="pl-PL" sz="2400" u="none" strike="noStrike" dirty="0">
+                          <a:effectLst/>
+                        </a:rPr>
+                        <a:t>Rozmiar</a:t>
+                      </a:r>
+                      <a:endParaRPr lang="pl-PL" sz="2400" b="0" i="0" u="none" strike="noStrike" dirty="0">
+                        <a:solidFill>
+                          <a:srgbClr val="000000"/>
+                        </a:solidFill>
+                        <a:effectLst/>
+                        <a:latin typeface="Calibri" panose="020F0502020204030204" pitchFamily="34" charset="0"/>
+                      </a:endParaRPr>
+                    </a:p>
+                  </a:txBody>
+                  <a:tcPr marL="9525" marR="9525" marT="9525" marB="0" anchor="b"/>
+                </a:tc>
+                <a:tc>
+                  <a:txBody>
+                    <a:bodyPr/>
+                    <a:lstStyle/>
+                    <a:p>
+                      <a:pPr algn="ctr" fontAlgn="b"/>
+                      <a:r>
+                        <a:rPr lang="pl-PL" sz="2400" b="0" i="0" u="none" strike="noStrike">
+                          <a:solidFill>
+                            <a:srgbClr val="000000"/>
+                          </a:solidFill>
+                          <a:effectLst/>
+                          <a:latin typeface="Calibri" panose="020F0502020204030204" pitchFamily="34" charset="0"/>
+                        </a:rPr>
+                        <a:t>40</a:t>
+                      </a:r>
+                    </a:p>
+                  </a:txBody>
+                  <a:tcPr marL="9525" marR="9525" marT="9525" marB="0" anchor="b"/>
+                </a:tc>
+                <a:extLst>
+                  <a:ext uri="{0D108BD9-81ED-4DB2-BD59-A6C34878D82A}">
+                    <a16:rowId xmlns:a16="http://schemas.microsoft.com/office/drawing/2014/main" val="2734115141"/>
+                  </a:ext>
+                </a:extLst>
+              </a:tr>
+              <a:tr h="461424">
+                <a:tc>
+                  <a:txBody>
+                    <a:bodyPr/>
+                    <a:lstStyle/>
+                    <a:p>
+                      <a:pPr algn="l" fontAlgn="b"/>
+                      <a:r>
+                        <a:rPr lang="pl-PL" sz="2400" u="none" strike="noStrike" dirty="0" err="1">
+                          <a:effectLst/>
+                        </a:rPr>
+                        <a:t>Zajace</a:t>
+                      </a:r>
+                      <a:endParaRPr lang="pl-PL" sz="2400" b="0" i="0" u="none" strike="noStrike" dirty="0">
+                        <a:solidFill>
+                          <a:srgbClr val="000000"/>
+                        </a:solidFill>
+                        <a:effectLst/>
+                        <a:latin typeface="Calibri" panose="020F0502020204030204" pitchFamily="34" charset="0"/>
+                      </a:endParaRPr>
+                    </a:p>
+                  </a:txBody>
+                  <a:tcPr marL="9525" marR="9525" marT="9525" marB="0" anchor="b"/>
+                </a:tc>
+                <a:tc>
+                  <a:txBody>
+                    <a:bodyPr/>
+                    <a:lstStyle/>
+                    <a:p>
+                      <a:pPr algn="ctr" fontAlgn="b"/>
+                      <a:r>
+                        <a:rPr lang="pl-PL" sz="2400" b="0" i="0" u="none" strike="noStrike">
+                          <a:solidFill>
+                            <a:srgbClr val="000000"/>
+                          </a:solidFill>
+                          <a:effectLst/>
+                          <a:latin typeface="Calibri" panose="020F0502020204030204" pitchFamily="34" charset="0"/>
+                        </a:rPr>
+                        <a:t>15</a:t>
+                      </a:r>
+                    </a:p>
+                  </a:txBody>
+                  <a:tcPr marL="9525" marR="9525" marT="9525" marB="0" anchor="b"/>
+                </a:tc>
+                <a:extLst>
+                  <a:ext uri="{0D108BD9-81ED-4DB2-BD59-A6C34878D82A}">
+                    <a16:rowId xmlns:a16="http://schemas.microsoft.com/office/drawing/2014/main" val="2616257337"/>
+                  </a:ext>
+                </a:extLst>
+              </a:tr>
+              <a:tr h="461424">
+                <a:tc>
+                  <a:txBody>
+                    <a:bodyPr/>
+                    <a:lstStyle/>
+                    <a:p>
+                      <a:pPr algn="l" fontAlgn="b"/>
+                      <a:r>
+                        <a:rPr lang="pl-PL" sz="2400" u="none" strike="noStrike" dirty="0" err="1">
+                          <a:effectLst/>
+                        </a:rPr>
+                        <a:t>Welociraptory</a:t>
+                      </a:r>
+                      <a:endParaRPr lang="pl-PL" sz="2400" b="0" i="0" u="none" strike="noStrike" dirty="0">
+                        <a:solidFill>
+                          <a:srgbClr val="000000"/>
+                        </a:solidFill>
+                        <a:effectLst/>
+                        <a:latin typeface="Calibri" panose="020F0502020204030204" pitchFamily="34" charset="0"/>
+                      </a:endParaRPr>
+                    </a:p>
+                  </a:txBody>
+                  <a:tcPr marL="9525" marR="9525" marT="9525" marB="0" anchor="b"/>
+                </a:tc>
+                <a:tc>
+                  <a:txBody>
+                    <a:bodyPr/>
+                    <a:lstStyle/>
+                    <a:p>
+                      <a:pPr algn="ctr" fontAlgn="b"/>
+                      <a:r>
+                        <a:rPr lang="pl-PL" sz="2400" b="0" i="0" u="none" strike="noStrike">
+                          <a:solidFill>
+                            <a:srgbClr val="000000"/>
+                          </a:solidFill>
+                          <a:effectLst/>
+                          <a:latin typeface="Calibri" panose="020F0502020204030204" pitchFamily="34" charset="0"/>
+                        </a:rPr>
+                        <a:t>15</a:t>
+                      </a:r>
+                    </a:p>
+                  </a:txBody>
+                  <a:tcPr marL="9525" marR="9525" marT="9525" marB="0" anchor="b"/>
+                </a:tc>
+                <a:extLst>
+                  <a:ext uri="{0D108BD9-81ED-4DB2-BD59-A6C34878D82A}">
+                    <a16:rowId xmlns:a16="http://schemas.microsoft.com/office/drawing/2014/main" val="719442360"/>
+                  </a:ext>
+                </a:extLst>
+              </a:tr>
+              <a:tr h="461424">
+                <a:tc>
+                  <a:txBody>
+                    <a:bodyPr/>
+                    <a:lstStyle/>
+                    <a:p>
+                      <a:pPr algn="l" fontAlgn="b"/>
+                      <a:r>
+                        <a:rPr lang="pl-PL" sz="2400" u="none" strike="noStrike">
+                          <a:effectLst/>
+                        </a:rPr>
+                        <a:t>Owoce Rozkoszy</a:t>
+                      </a:r>
+                      <a:endParaRPr lang="pl-PL" sz="2400" b="0" i="0" u="none" strike="noStrike">
+                        <a:solidFill>
+                          <a:srgbClr val="000000"/>
+                        </a:solidFill>
+                        <a:effectLst/>
+                        <a:latin typeface="Calibri" panose="020F0502020204030204" pitchFamily="34" charset="0"/>
+                      </a:endParaRPr>
+                    </a:p>
+                  </a:txBody>
+                  <a:tcPr marL="9525" marR="9525" marT="9525" marB="0" anchor="b"/>
+                </a:tc>
+                <a:tc>
+                  <a:txBody>
+                    <a:bodyPr/>
+                    <a:lstStyle/>
+                    <a:p>
+                      <a:pPr algn="ctr" fontAlgn="b"/>
+                      <a:r>
+                        <a:rPr lang="pl-PL" sz="2400" b="0" i="0" u="none" strike="noStrike">
+                          <a:solidFill>
+                            <a:srgbClr val="000000"/>
+                          </a:solidFill>
+                          <a:effectLst/>
+                          <a:latin typeface="Calibri" panose="020F0502020204030204" pitchFamily="34" charset="0"/>
+                        </a:rPr>
+                        <a:t>30</a:t>
+                      </a:r>
+                    </a:p>
+                  </a:txBody>
+                  <a:tcPr marL="9525" marR="9525" marT="9525" marB="0" anchor="b"/>
+                </a:tc>
+                <a:extLst>
+                  <a:ext uri="{0D108BD9-81ED-4DB2-BD59-A6C34878D82A}">
+                    <a16:rowId xmlns:a16="http://schemas.microsoft.com/office/drawing/2014/main" val="2679973117"/>
+                  </a:ext>
+                </a:extLst>
+              </a:tr>
+              <a:tr h="461424">
+                <a:tc>
+                  <a:txBody>
+                    <a:bodyPr/>
+                    <a:lstStyle/>
+                    <a:p>
+                      <a:pPr algn="l" fontAlgn="b"/>
+                      <a:r>
+                        <a:rPr lang="pl-PL" sz="2400" u="none" strike="noStrike" dirty="0">
+                          <a:effectLst/>
+                        </a:rPr>
+                        <a:t>Szansa na przedawkowanie </a:t>
+                      </a:r>
+                      <a:r>
+                        <a:rPr lang="pl-PL" sz="2400" u="none" strike="noStrike" dirty="0" err="1">
+                          <a:effectLst/>
+                        </a:rPr>
+                        <a:t>zajaca</a:t>
+                      </a:r>
+                      <a:endParaRPr lang="pl-PL" sz="2400" b="0" i="0" u="none" strike="noStrike" dirty="0">
+                        <a:solidFill>
+                          <a:srgbClr val="000000"/>
+                        </a:solidFill>
+                        <a:effectLst/>
+                        <a:latin typeface="Calibri" panose="020F0502020204030204" pitchFamily="34" charset="0"/>
+                      </a:endParaRPr>
+                    </a:p>
+                  </a:txBody>
+                  <a:tcPr marL="9525" marR="9525" marT="9525" marB="0" anchor="b"/>
+                </a:tc>
+                <a:tc>
+                  <a:txBody>
+                    <a:bodyPr/>
+                    <a:lstStyle/>
+                    <a:p>
+                      <a:pPr algn="ctr" fontAlgn="b"/>
+                      <a:r>
+                        <a:rPr lang="pl-PL" sz="2400" b="0" i="0" u="none" strike="noStrike">
+                          <a:solidFill>
+                            <a:srgbClr val="000000"/>
+                          </a:solidFill>
+                          <a:effectLst/>
+                          <a:latin typeface="Calibri" panose="020F0502020204030204" pitchFamily="34" charset="0"/>
+                        </a:rPr>
+                        <a:t>1</a:t>
+                      </a:r>
+                    </a:p>
+                  </a:txBody>
+                  <a:tcPr marL="9525" marR="9525" marT="9525" marB="0" anchor="b"/>
+                </a:tc>
+                <a:extLst>
+                  <a:ext uri="{0D108BD9-81ED-4DB2-BD59-A6C34878D82A}">
+                    <a16:rowId xmlns:a16="http://schemas.microsoft.com/office/drawing/2014/main" val="359944270"/>
+                  </a:ext>
+                </a:extLst>
+              </a:tr>
+              <a:tr h="461424">
+                <a:tc>
+                  <a:txBody>
+                    <a:bodyPr/>
+                    <a:lstStyle/>
+                    <a:p>
+                      <a:pPr algn="l" fontAlgn="b"/>
+                      <a:r>
+                        <a:rPr lang="pl-PL" sz="2400" u="none" strike="noStrike" dirty="0">
+                          <a:effectLst/>
+                        </a:rPr>
+                        <a:t>Szansa na przed. </a:t>
+                      </a:r>
+                      <a:r>
+                        <a:rPr lang="pl-PL" sz="2400" u="none" strike="noStrike" dirty="0" err="1">
+                          <a:effectLst/>
+                        </a:rPr>
+                        <a:t>Welociraptora</a:t>
+                      </a:r>
+                      <a:endParaRPr lang="pl-PL" sz="2400" b="0" i="0" u="none" strike="noStrike" dirty="0">
+                        <a:solidFill>
+                          <a:srgbClr val="000000"/>
+                        </a:solidFill>
+                        <a:effectLst/>
+                        <a:latin typeface="Calibri" panose="020F0502020204030204" pitchFamily="34" charset="0"/>
+                      </a:endParaRPr>
+                    </a:p>
+                  </a:txBody>
+                  <a:tcPr marL="9525" marR="9525" marT="9525" marB="0" anchor="b"/>
+                </a:tc>
+                <a:tc>
+                  <a:txBody>
+                    <a:bodyPr/>
+                    <a:lstStyle/>
+                    <a:p>
+                      <a:pPr algn="ctr" fontAlgn="b"/>
+                      <a:r>
+                        <a:rPr lang="pl-PL" sz="2400" b="0" i="0" u="none" strike="noStrike">
+                          <a:solidFill>
+                            <a:srgbClr val="000000"/>
+                          </a:solidFill>
+                          <a:effectLst/>
+                          <a:latin typeface="Calibri" panose="020F0502020204030204" pitchFamily="34" charset="0"/>
+                        </a:rPr>
+                        <a:t>5</a:t>
+                      </a:r>
+                    </a:p>
+                  </a:txBody>
+                  <a:tcPr marL="9525" marR="9525" marT="9525" marB="0" anchor="b"/>
+                </a:tc>
+                <a:extLst>
+                  <a:ext uri="{0D108BD9-81ED-4DB2-BD59-A6C34878D82A}">
+                    <a16:rowId xmlns:a16="http://schemas.microsoft.com/office/drawing/2014/main" val="2884980630"/>
+                  </a:ext>
+                </a:extLst>
+              </a:tr>
+              <a:tr h="461424">
+                <a:tc>
+                  <a:txBody>
+                    <a:bodyPr/>
+                    <a:lstStyle/>
+                    <a:p>
+                      <a:pPr algn="l" fontAlgn="b"/>
+                      <a:r>
+                        <a:rPr lang="pl-PL" sz="2400" u="none" strike="noStrike" dirty="0">
+                          <a:effectLst/>
+                        </a:rPr>
+                        <a:t>Terytorium Wiedźmy</a:t>
+                      </a:r>
+                      <a:endParaRPr lang="pl-PL" sz="2400" b="0" i="0" u="none" strike="noStrike" dirty="0">
+                        <a:solidFill>
+                          <a:srgbClr val="000000"/>
+                        </a:solidFill>
+                        <a:effectLst/>
+                        <a:latin typeface="Calibri" panose="020F0502020204030204" pitchFamily="34" charset="0"/>
+                      </a:endParaRPr>
+                    </a:p>
+                  </a:txBody>
+                  <a:tcPr marL="9525" marR="9525" marT="9525" marB="0" anchor="b"/>
+                </a:tc>
+                <a:tc>
+                  <a:txBody>
+                    <a:bodyPr/>
+                    <a:lstStyle/>
+                    <a:p>
+                      <a:pPr algn="ctr" fontAlgn="b"/>
+                      <a:r>
+                        <a:rPr lang="pl-PL" sz="2400" b="0" i="0" u="none" strike="noStrike">
+                          <a:solidFill>
+                            <a:srgbClr val="000000"/>
+                          </a:solidFill>
+                          <a:effectLst/>
+                          <a:latin typeface="Calibri" panose="020F0502020204030204" pitchFamily="34" charset="0"/>
+                        </a:rPr>
+                        <a:t>15</a:t>
+                      </a:r>
+                    </a:p>
+                  </a:txBody>
+                  <a:tcPr marL="9525" marR="9525" marT="9525" marB="0" anchor="b"/>
+                </a:tc>
+                <a:extLst>
+                  <a:ext uri="{0D108BD9-81ED-4DB2-BD59-A6C34878D82A}">
+                    <a16:rowId xmlns:a16="http://schemas.microsoft.com/office/drawing/2014/main" val="2236162618"/>
+                  </a:ext>
+                </a:extLst>
+              </a:tr>
+              <a:tr h="461424">
+                <a:tc>
+                  <a:txBody>
+                    <a:bodyPr/>
+                    <a:lstStyle/>
+                    <a:p>
+                      <a:pPr algn="l" fontAlgn="b"/>
+                      <a:r>
+                        <a:rPr lang="pl-PL" sz="2400" u="none" strike="noStrike" dirty="0">
+                          <a:effectLst/>
+                        </a:rPr>
+                        <a:t>Szansa na wybuch wiedźmy</a:t>
+                      </a:r>
+                      <a:endParaRPr lang="pl-PL" sz="2400" b="0" i="0" u="none" strike="noStrike" dirty="0">
+                        <a:solidFill>
+                          <a:srgbClr val="000000"/>
+                        </a:solidFill>
+                        <a:effectLst/>
+                        <a:latin typeface="Calibri" panose="020F0502020204030204" pitchFamily="34" charset="0"/>
+                      </a:endParaRPr>
+                    </a:p>
+                  </a:txBody>
+                  <a:tcPr marL="9525" marR="9525" marT="9525" marB="0" anchor="b"/>
+                </a:tc>
+                <a:tc>
+                  <a:txBody>
+                    <a:bodyPr/>
+                    <a:lstStyle/>
+                    <a:p>
+                      <a:pPr algn="ctr" fontAlgn="b"/>
+                      <a:r>
+                        <a:rPr lang="pl-PL" sz="2400" b="0" i="0" u="none" strike="noStrike">
+                          <a:solidFill>
+                            <a:srgbClr val="000000"/>
+                          </a:solidFill>
+                          <a:effectLst/>
+                          <a:latin typeface="Calibri" panose="020F0502020204030204" pitchFamily="34" charset="0"/>
+                        </a:rPr>
+                        <a:t>1</a:t>
+                      </a:r>
+                    </a:p>
+                  </a:txBody>
+                  <a:tcPr marL="9525" marR="9525" marT="9525" marB="0" anchor="b"/>
+                </a:tc>
+                <a:extLst>
+                  <a:ext uri="{0D108BD9-81ED-4DB2-BD59-A6C34878D82A}">
+                    <a16:rowId xmlns:a16="http://schemas.microsoft.com/office/drawing/2014/main" val="1807210762"/>
+                  </a:ext>
+                </a:extLst>
+              </a:tr>
+              <a:tr h="484496">
+                <a:tc>
+                  <a:txBody>
+                    <a:bodyPr/>
+                    <a:lstStyle/>
+                    <a:p>
+                      <a:pPr algn="l" fontAlgn="b"/>
+                      <a:r>
+                        <a:rPr lang="pl-PL" sz="2400" u="none" strike="noStrike" dirty="0">
+                          <a:effectLst/>
+                        </a:rPr>
+                        <a:t>Ilość epok</a:t>
+                      </a:r>
+                      <a:endParaRPr lang="pl-PL" sz="2400" b="0" i="0" u="none" strike="noStrike" dirty="0">
+                        <a:solidFill>
+                          <a:srgbClr val="000000"/>
+                        </a:solidFill>
+                        <a:effectLst/>
+                        <a:latin typeface="Calibri" panose="020F0502020204030204" pitchFamily="34" charset="0"/>
+                      </a:endParaRPr>
+                    </a:p>
+                  </a:txBody>
+                  <a:tcPr marL="9525" marR="9525" marT="9525" marB="0" anchor="b"/>
+                </a:tc>
+                <a:tc>
+                  <a:txBody>
+                    <a:bodyPr/>
+                    <a:lstStyle/>
+                    <a:p>
+                      <a:pPr algn="ctr" fontAlgn="b"/>
+                      <a:r>
+                        <a:rPr lang="pl-PL" sz="2400" b="0" i="0" u="none" strike="noStrike" dirty="0">
+                          <a:solidFill>
+                            <a:srgbClr val="000000"/>
+                          </a:solidFill>
+                          <a:effectLst/>
+                          <a:latin typeface="Calibri" panose="020F0502020204030204" pitchFamily="34" charset="0"/>
+                        </a:rPr>
+                        <a:t>50</a:t>
+                      </a:r>
+                    </a:p>
+                  </a:txBody>
+                  <a:tcPr marL="9525" marR="9525" marT="9525" marB="0" anchor="b"/>
+                </a:tc>
+                <a:extLst>
+                  <a:ext uri="{0D108BD9-81ED-4DB2-BD59-A6C34878D82A}">
+                    <a16:rowId xmlns:a16="http://schemas.microsoft.com/office/drawing/2014/main" val="2340674816"/>
+                  </a:ext>
+                </a:extLst>
+              </a:tr>
+            </a:tbl>
+          </a:graphicData>
+        </a:graphic>
+      </p:graphicFrame>
+    </p:spTree>
+    <p:extLst>
+      <p:ext uri="{BB962C8B-B14F-4D97-AF65-F5344CB8AC3E}">
+        <p14:creationId xmlns:p14="http://schemas.microsoft.com/office/powerpoint/2010/main" val="781573558"/>
+      </p:ext>
+    </p:extLst>
+  </p:cSld>
+  <p:clrMapOvr>
+    <a:masterClrMapping/>
+  </p:clrMapOvr>
+  <mc:AlternateContent xmlns:mc="http://schemas.openxmlformats.org/markup-compatibility/2006">
+    <mc:Choice xmlns:p159="http://schemas.microsoft.com/office/powerpoint/2015/09/main" Requires="p159">
+      <p:transition spd="slow">
+        <p159:morph option="byObject"/>
+      </p:transition>
+    </mc:Choice>
+    <mc:Fallback>
+      <p:transition spd="slow">
+        <p:fade/>
+      </p:transition>
+    </mc:Fallback>
+  </mc:AlternateContent>
+</p:sld>
+</file>
+
+<file path=ppt/slides/slide11.xml><?xml version="1.0" encoding="utf-8"?>
 <p:sld xmlns:a="http://schemas.openxmlformats.org/drawingml/2006/main" xmlns:r="http://schemas.openxmlformats.org/officeDocument/2006/relationships" xmlns:p="http://schemas.openxmlformats.org/presentationml/2006/main">
   <p:cSld>
     <p:spTree>
@@ -14197,6 +15071,140 @@
   <p:clrMapOvr>
     <a:masterClrMapping/>
   </p:clrMapOvr>
+  <mc:AlternateContent xmlns:mc="http://schemas.openxmlformats.org/markup-compatibility/2006">
+    <mc:Choice xmlns:p159="http://schemas.microsoft.com/office/powerpoint/2015/09/main" Requires="p159">
+      <p:transition spd="slow">
+        <p159:morph option="byObject"/>
+      </p:transition>
+    </mc:Choice>
+    <mc:Fallback>
+      <p:transition spd="slow">
+        <p:fade/>
+      </p:transition>
+    </mc:Fallback>
+  </mc:AlternateContent>
+</p:sld>
+</file>
+
+<file path=ppt/slides/slide12.xml><?xml version="1.0" encoding="utf-8"?>
+<p:sld xmlns:a="http://schemas.openxmlformats.org/drawingml/2006/main" xmlns:r="http://schemas.openxmlformats.org/officeDocument/2006/relationships" xmlns:p="http://schemas.openxmlformats.org/presentationml/2006/main">
+  <p:cSld>
+    <p:spTree>
+      <p:nvGrpSpPr>
+        <p:cNvPr id="1" name=""/>
+        <p:cNvGrpSpPr/>
+        <p:nvPr/>
+      </p:nvGrpSpPr>
+      <p:grpSpPr>
+        <a:xfrm>
+          <a:off x="0" y="0"/>
+          <a:ext cx="0" cy="0"/>
+          <a:chOff x="0" y="0"/>
+          <a:chExt cx="0" cy="0"/>
+        </a:xfrm>
+      </p:grpSpPr>
+      <p:sp>
+        <p:nvSpPr>
+          <p:cNvPr id="2" name="Tytuł 1">
+            <a:extLst>
+              <a:ext uri="{FF2B5EF4-FFF2-40B4-BE49-F238E27FC236}">
+                <a16:creationId xmlns:a16="http://schemas.microsoft.com/office/drawing/2014/main" id="{658A070F-4F9A-393F-F345-CDCDA3A7972B}"/>
+              </a:ext>
+            </a:extLst>
+          </p:cNvPr>
+          <p:cNvSpPr>
+            <a:spLocks noGrp="1"/>
+          </p:cNvSpPr>
+          <p:nvPr>
+            <p:ph type="title"/>
+          </p:nvPr>
+        </p:nvSpPr>
+        <p:spPr/>
+        <p:txBody>
+          <a:bodyPr>
+            <a:normAutofit/>
+          </a:bodyPr>
+          <a:lstStyle/>
+          <a:p>
+            <a:r>
+              <a:rPr lang="pl-PL" sz="4400"/>
+              <a:t>Dziękujemy za uwagę</a:t>
+            </a:r>
+            <a:endParaRPr lang="pl-PL" sz="4400" dirty="0"/>
+          </a:p>
+        </p:txBody>
+      </p:sp>
+      <p:sp>
+        <p:nvSpPr>
+          <p:cNvPr id="3" name="Symbol zastępczy zawartości 2">
+            <a:extLst>
+              <a:ext uri="{FF2B5EF4-FFF2-40B4-BE49-F238E27FC236}">
+                <a16:creationId xmlns:a16="http://schemas.microsoft.com/office/drawing/2014/main" id="{4DA34A77-4733-F667-A74E-66445117E855}"/>
+              </a:ext>
+            </a:extLst>
+          </p:cNvPr>
+          <p:cNvSpPr>
+            <a:spLocks noGrp="1"/>
+          </p:cNvSpPr>
+          <p:nvPr>
+            <p:ph idx="1"/>
+          </p:nvPr>
+        </p:nvSpPr>
+        <p:spPr/>
+        <p:txBody>
+          <a:bodyPr/>
+          <a:lstStyle/>
+          <a:p>
+            <a:pPr marL="0" indent="0" algn="ctr">
+              <a:buNone/>
+            </a:pPr>
+            <a:r>
+              <a:rPr lang="pl-PL" sz="2800" b="0" cap="none" spc="0">
+                <a:ln w="0"/>
+                <a:solidFill>
+                  <a:schemeClr val="tx1"/>
+                </a:solidFill>
+                <a:effectLst>
+                  <a:outerShdw blurRad="38100" dist="19050" dir="2700000" algn="tl" rotWithShape="0">
+                    <a:schemeClr val="dk1">
+                      <a:alpha val="40000"/>
+                    </a:schemeClr>
+                  </a:outerShdw>
+                </a:effectLst>
+              </a:rPr>
+              <a:t>Klawon &amp; Nowaczyk Studio S.A</a:t>
+            </a:r>
+          </a:p>
+          <a:p>
+            <a:pPr marL="0" indent="0">
+              <a:buNone/>
+            </a:pPr>
+            <a:endParaRPr lang="pl-PL" dirty="0"/>
+          </a:p>
+        </p:txBody>
+      </p:sp>
+    </p:spTree>
+    <p:extLst>
+      <p:ext uri="{BB962C8B-B14F-4D97-AF65-F5344CB8AC3E}">
+        <p14:creationId xmlns:p14="http://schemas.microsoft.com/office/powerpoint/2010/main" val="915422415"/>
+      </p:ext>
+    </p:extLst>
+  </p:cSld>
+  <p:clrMapOvr>
+    <a:masterClrMapping/>
+  </p:clrMapOvr>
+  <mc:AlternateContent xmlns:mc="http://schemas.openxmlformats.org/markup-compatibility/2006">
+    <mc:Choice xmlns:p159="http://schemas.microsoft.com/office/powerpoint/2015/09/main" Requires="p159">
+      <p:transition spd="slow">
+        <p159:morph option="byObject"/>
+      </p:transition>
+    </mc:Choice>
+    <mc:Fallback>
+      <p:transition spd="slow">
+        <p:fade/>
+      </p:transition>
+    </mc:Fallback>
+  </mc:AlternateContent>
 </p:sld>
 </file>
 
@@ -14307,10 +15315,721 @@
   <p:clrMapOvr>
     <a:masterClrMapping/>
   </p:clrMapOvr>
+  <mc:AlternateContent xmlns:mc="http://schemas.openxmlformats.org/markup-compatibility/2006">
+    <mc:Choice xmlns:p159="http://schemas.microsoft.com/office/powerpoint/2015/09/main" Requires="p159">
+      <p:transition spd="slow">
+        <p159:morph option="byObject"/>
+      </p:transition>
+    </mc:Choice>
+    <mc:Fallback>
+      <p:transition spd="slow">
+        <p:fade/>
+      </p:transition>
+    </mc:Fallback>
+  </mc:AlternateContent>
 </p:sld>
 </file>
 
 <file path=ppt/slides/slide3.xml><?xml version="1.0" encoding="utf-8"?>
+<p:sld xmlns:a="http://schemas.openxmlformats.org/drawingml/2006/main" xmlns:r="http://schemas.openxmlformats.org/officeDocument/2006/relationships" xmlns:p="http://schemas.openxmlformats.org/presentationml/2006/main">
+  <p:cSld>
+    <p:bg>
+      <p:bgPr>
+        <a:gradFill rotWithShape="1">
+          <a:gsLst>
+            <a:gs pos="0">
+              <a:schemeClr val="bg1">
+                <a:tint val="90000"/>
+                <a:lumMod val="110000"/>
+              </a:schemeClr>
+            </a:gs>
+            <a:gs pos="100000">
+              <a:schemeClr val="bg1">
+                <a:shade val="64000"/>
+                <a:lumMod val="88000"/>
+              </a:schemeClr>
+            </a:gs>
+          </a:gsLst>
+          <a:lin ang="5400000" scaled="0"/>
+        </a:gradFill>
+        <a:effectLst/>
+      </p:bgPr>
+    </p:bg>
+    <p:spTree>
+      <p:nvGrpSpPr>
+        <p:cNvPr id="1" name=""/>
+        <p:cNvGrpSpPr/>
+        <p:nvPr/>
+      </p:nvGrpSpPr>
+      <p:grpSpPr>
+        <a:xfrm>
+          <a:off x="0" y="0"/>
+          <a:ext cx="0" cy="0"/>
+          <a:chOff x="0" y="0"/>
+          <a:chExt cx="0" cy="0"/>
+        </a:xfrm>
+      </p:grpSpPr>
+      <p:pic>
+        <p:nvPicPr>
+          <p:cNvPr id="1037" name="Picture 2">
+            <a:extLst>
+              <a:ext uri="{FF2B5EF4-FFF2-40B4-BE49-F238E27FC236}">
+                <a16:creationId xmlns:a16="http://schemas.microsoft.com/office/drawing/2014/main" id="{E329ADF2-0541-4770-8D6F-7F7392064B14}"/>
+              </a:ext>
+              <a:ext uri="{C183D7F6-B498-43B3-948B-1728B52AA6E4}">
+                <adec:decorative xmlns:adec="http://schemas.microsoft.com/office/drawing/2017/decorative" val="1"/>
+              </a:ext>
+            </a:extLst>
+          </p:cNvPr>
+          <p:cNvPicPr>
+            <a:picLocks noGrp="1" noRot="1" noChangeAspect="1" noMove="1" noResize="1" noEditPoints="1" noAdjustHandles="1" noChangeArrowheads="1" noChangeShapeType="1" noCrop="1"/>
+          </p:cNvPicPr>
+          <p:nvPr>
+            <p:extLst>
+              <p:ext uri="{386F3935-93C4-4BCD-93E2-E3B085C9AB24}">
+                <p16:designElem xmlns:p16="http://schemas.microsoft.com/office/powerpoint/2015/main" val="1"/>
+              </p:ext>
+            </p:extLst>
+          </p:nvPr>
+        </p:nvPicPr>
+        <p:blipFill>
+          <a:blip r:embed="rId2">
+            <a:alphaModFix/>
+            <a:extLst>
+              <a:ext uri="{28A0092B-C50C-407E-A947-70E740481C1C}">
+                <a14:useLocalDpi xmlns:a14="http://schemas.microsoft.com/office/drawing/2010/main" val="0"/>
+              </a:ext>
+            </a:extLst>
+          </a:blip>
+          <a:srcRect/>
+          <a:stretch>
+            <a:fillRect/>
+          </a:stretch>
+        </p:blipFill>
+        <p:spPr bwMode="auto">
+          <a:xfrm>
+            <a:off x="0" y="-1"/>
+            <a:ext cx="12192003" cy="6858001"/>
+          </a:xfrm>
+          <a:prstGeom prst="rect">
+            <a:avLst/>
+          </a:prstGeom>
+          <a:noFill/>
+          <a:extLst>
+            <a:ext uri="{909E8E84-426E-40DD-AFC4-6F175D3DCCD1}">
+              <a14:hiddenFill xmlns:a14="http://schemas.microsoft.com/office/drawing/2010/main">
+                <a:solidFill>
+                  <a:srgbClr val="FFFFFF"/>
+                </a:solidFill>
+              </a14:hiddenFill>
+            </a:ext>
+          </a:extLst>
+        </p:spPr>
+      </p:pic>
+      <p:pic>
+        <p:nvPicPr>
+          <p:cNvPr id="1039" name="Picture 1038">
+            <a:extLst>
+              <a:ext uri="{FF2B5EF4-FFF2-40B4-BE49-F238E27FC236}">
+                <a16:creationId xmlns:a16="http://schemas.microsoft.com/office/drawing/2014/main" id="{DB042749-FB5E-4C0B-867D-6D25FB5FF0AA}"/>
+              </a:ext>
+              <a:ext uri="{C183D7F6-B498-43B3-948B-1728B52AA6E4}">
+                <adec:decorative xmlns:adec="http://schemas.microsoft.com/office/drawing/2017/decorative" val="1"/>
+              </a:ext>
+            </a:extLst>
+          </p:cNvPr>
+          <p:cNvPicPr>
+            <a:picLocks noGrp="1" noRot="1" noChangeAspect="1" noMove="1" noResize="1" noEditPoints="1" noAdjustHandles="1" noChangeArrowheads="1" noChangeShapeType="1" noCrop="1"/>
+          </p:cNvPicPr>
+          <p:nvPr>
+            <p:extLst>
+              <p:ext uri="{386F3935-93C4-4BCD-93E2-E3B085C9AB24}">
+                <p16:designElem xmlns:p16="http://schemas.microsoft.com/office/powerpoint/2015/main" val="1"/>
+              </p:ext>
+            </p:extLst>
+          </p:nvPr>
+        </p:nvPicPr>
+        <p:blipFill>
+          <a:blip r:embed="rId3">
+            <a:extLst>
+              <a:ext uri="{28A0092B-C50C-407E-A947-70E740481C1C}">
+                <a14:useLocalDpi xmlns:a14="http://schemas.microsoft.com/office/drawing/2010/main" val="0"/>
+              </a:ext>
+            </a:extLst>
+          </a:blip>
+          <a:stretch>
+            <a:fillRect/>
+          </a:stretch>
+        </p:blipFill>
+        <p:spPr>
+          <a:xfrm>
+            <a:off x="0" y="0"/>
+            <a:ext cx="12192000" cy="6858000"/>
+          </a:xfrm>
+          <a:prstGeom prst="rect">
+            <a:avLst/>
+          </a:prstGeom>
+        </p:spPr>
+      </p:pic>
+      <p:sp useBgFill="1">
+        <p:nvSpPr>
+          <p:cNvPr id="1041" name="Rectangle 1040">
+            <a:extLst>
+              <a:ext uri="{FF2B5EF4-FFF2-40B4-BE49-F238E27FC236}">
+                <a16:creationId xmlns:a16="http://schemas.microsoft.com/office/drawing/2014/main" id="{760CE105-C7BB-46B3-821C-82BED63A6E0A}"/>
+              </a:ext>
+              <a:ext uri="{C183D7F6-B498-43B3-948B-1728B52AA6E4}">
+                <adec:decorative xmlns:adec="http://schemas.microsoft.com/office/drawing/2017/decorative" val="1"/>
+              </a:ext>
+            </a:extLst>
+          </p:cNvPr>
+          <p:cNvSpPr>
+            <a:spLocks noGrp="1" noRot="1" noChangeAspect="1" noMove="1" noResize="1" noEditPoints="1" noAdjustHandles="1" noChangeArrowheads="1" noChangeShapeType="1" noTextEdit="1"/>
+          </p:cNvSpPr>
+          <p:nvPr>
+            <p:extLst>
+              <p:ext uri="{386F3935-93C4-4BCD-93E2-E3B085C9AB24}">
+                <p16:designElem xmlns:p16="http://schemas.microsoft.com/office/powerpoint/2015/main" val="1"/>
+              </p:ext>
+            </p:extLst>
+          </p:nvPr>
+        </p:nvSpPr>
+        <p:spPr>
+          <a:xfrm>
+            <a:off x="0" y="0"/>
+            <a:ext cx="12192000" cy="6858000"/>
+          </a:xfrm>
+          <a:prstGeom prst="rect">
+            <a:avLst/>
+          </a:prstGeom>
+          <a:ln>
+            <a:noFill/>
+          </a:ln>
+        </p:spPr>
+        <p:style>
+          <a:lnRef idx="2">
+            <a:schemeClr val="accent1">
+              <a:shade val="50000"/>
+            </a:schemeClr>
+          </a:lnRef>
+          <a:fillRef idx="1">
+            <a:schemeClr val="accent1"/>
+          </a:fillRef>
+          <a:effectRef idx="0">
+            <a:schemeClr val="accent1"/>
+          </a:effectRef>
+          <a:fontRef idx="minor">
+            <a:schemeClr val="lt1"/>
+          </a:fontRef>
+        </p:style>
+        <p:txBody>
+          <a:bodyPr rtlCol="0" anchor="ctr"/>
+          <a:lstStyle/>
+          <a:p>
+            <a:pPr algn="ctr"/>
+            <a:endParaRPr lang="en-US"/>
+          </a:p>
+        </p:txBody>
+      </p:sp>
+      <p:pic>
+        <p:nvPicPr>
+          <p:cNvPr id="1043" name="Picture 2">
+            <a:extLst>
+              <a:ext uri="{FF2B5EF4-FFF2-40B4-BE49-F238E27FC236}">
+                <a16:creationId xmlns:a16="http://schemas.microsoft.com/office/drawing/2014/main" id="{1BBC21E4-EBAB-40A6-893B-F781E3371D6B}"/>
+              </a:ext>
+              <a:ext uri="{C183D7F6-B498-43B3-948B-1728B52AA6E4}">
+                <adec:decorative xmlns:adec="http://schemas.microsoft.com/office/drawing/2017/decorative" val="1"/>
+              </a:ext>
+            </a:extLst>
+          </p:cNvPr>
+          <p:cNvPicPr>
+            <a:picLocks noGrp="1" noRot="1" noChangeAspect="1" noMove="1" noResize="1" noEditPoints="1" noAdjustHandles="1" noChangeArrowheads="1" noChangeShapeType="1" noCrop="1"/>
+          </p:cNvPicPr>
+          <p:nvPr>
+            <p:extLst>
+              <p:ext uri="{386F3935-93C4-4BCD-93E2-E3B085C9AB24}">
+                <p16:designElem xmlns:p16="http://schemas.microsoft.com/office/powerpoint/2015/main" val="1"/>
+              </p:ext>
+            </p:extLst>
+          </p:nvPr>
+        </p:nvPicPr>
+        <p:blipFill>
+          <a:blip r:embed="rId2">
+            <a:alphaModFix amt="70000"/>
+            <a:extLst>
+              <a:ext uri="{28A0092B-C50C-407E-A947-70E740481C1C}">
+                <a14:useLocalDpi xmlns:a14="http://schemas.microsoft.com/office/drawing/2010/main" val="0"/>
+              </a:ext>
+            </a:extLst>
+          </a:blip>
+          <a:srcRect/>
+          <a:stretch>
+            <a:fillRect/>
+          </a:stretch>
+        </p:blipFill>
+        <p:spPr bwMode="auto">
+          <a:xfrm>
+            <a:off x="0" y="-1"/>
+            <a:ext cx="12192003" cy="6858001"/>
+          </a:xfrm>
+          <a:prstGeom prst="rect">
+            <a:avLst/>
+          </a:prstGeom>
+          <a:noFill/>
+          <a:extLst>
+            <a:ext uri="{909E8E84-426E-40DD-AFC4-6F175D3DCCD1}">
+              <a14:hiddenFill xmlns:a14="http://schemas.microsoft.com/office/drawing/2010/main">
+                <a:solidFill>
+                  <a:srgbClr val="FFFFFF"/>
+                </a:solidFill>
+              </a14:hiddenFill>
+            </a:ext>
+          </a:extLst>
+        </p:spPr>
+      </p:pic>
+      <p:sp>
+        <p:nvSpPr>
+          <p:cNvPr id="1045" name="Rounded Rectangle 13">
+            <a:extLst>
+              <a:ext uri="{FF2B5EF4-FFF2-40B4-BE49-F238E27FC236}">
+                <a16:creationId xmlns:a16="http://schemas.microsoft.com/office/drawing/2014/main" id="{91D60D6D-74C1-4244-ABB3-2A20561CC4DC}"/>
+              </a:ext>
+              <a:ext uri="{C183D7F6-B498-43B3-948B-1728B52AA6E4}">
+                <adec:decorative xmlns:adec="http://schemas.microsoft.com/office/drawing/2017/decorative" val="1"/>
+              </a:ext>
+            </a:extLst>
+          </p:cNvPr>
+          <p:cNvSpPr>
+            <a:spLocks noGrp="1" noRot="1" noChangeAspect="1" noMove="1" noResize="1" noEditPoints="1" noAdjustHandles="1" noChangeArrowheads="1" noChangeShapeType="1" noTextEdit="1"/>
+          </p:cNvSpPr>
+          <p:nvPr>
+            <p:extLst>
+              <p:ext uri="{386F3935-93C4-4BCD-93E2-E3B085C9AB24}">
+                <p16:designElem xmlns:p16="http://schemas.microsoft.com/office/powerpoint/2015/main" val="1"/>
+              </p:ext>
+            </p:extLst>
+          </p:nvPr>
+        </p:nvSpPr>
+        <p:spPr>
+          <a:xfrm>
+            <a:off x="913774" y="550655"/>
+            <a:ext cx="10364452" cy="3690466"/>
+          </a:xfrm>
+          <a:prstGeom prst="roundRect">
+            <a:avLst>
+              <a:gd name="adj" fmla="val 4838"/>
+            </a:avLst>
+          </a:prstGeom>
+          <a:solidFill>
+            <a:srgbClr val="FFFFFF"/>
+          </a:solidFill>
+          <a:ln w="82550" cap="sq">
+            <a:solidFill>
+              <a:srgbClr val="EAEAEA"/>
+            </a:solidFill>
+            <a:miter lim="800000"/>
+          </a:ln>
+          <a:effectLst/>
+          <a:scene3d>
+            <a:camera prst="orthographicFront"/>
+            <a:lightRig rig="threePt" dir="t">
+              <a:rot lat="0" lon="0" rev="2700000"/>
+            </a:lightRig>
+          </a:scene3d>
+          <a:sp3d contourW="6350">
+            <a:bevelT h="38100"/>
+            <a:contourClr>
+              <a:srgbClr val="C0C0C0"/>
+            </a:contourClr>
+          </a:sp3d>
+        </p:spPr>
+        <p:style>
+          <a:lnRef idx="2">
+            <a:schemeClr val="accent1">
+              <a:shade val="50000"/>
+            </a:schemeClr>
+          </a:lnRef>
+          <a:fillRef idx="1">
+            <a:schemeClr val="accent1"/>
+          </a:fillRef>
+          <a:effectRef idx="0">
+            <a:schemeClr val="accent1"/>
+          </a:effectRef>
+          <a:fontRef idx="minor">
+            <a:schemeClr val="lt1"/>
+          </a:fontRef>
+        </p:style>
+        <p:txBody>
+          <a:bodyPr rtlCol="0" anchor="ctr"/>
+          <a:lstStyle/>
+          <a:p>
+            <a:pPr algn="ctr"/>
+            <a:endParaRPr lang="en-US"/>
+          </a:p>
+        </p:txBody>
+      </p:sp>
+      <p:pic>
+        <p:nvPicPr>
+          <p:cNvPr id="1026" name="Picture 2" descr="75,354 Zając Grafika Wektorowa, Clipartów i Ilustracji - 123RF">
+            <a:extLst>
+              <a:ext uri="{FF2B5EF4-FFF2-40B4-BE49-F238E27FC236}">
+                <a16:creationId xmlns:a16="http://schemas.microsoft.com/office/drawing/2014/main" id="{57B01559-9D86-10D9-7F99-7334BC7CD28B}"/>
+              </a:ext>
+            </a:extLst>
+          </p:cNvPr>
+          <p:cNvPicPr>
+            <a:picLocks noChangeAspect="1" noChangeArrowheads="1"/>
+          </p:cNvPicPr>
+          <p:nvPr/>
+        </p:nvPicPr>
+        <p:blipFill>
+          <a:blip r:embed="rId4">
+            <a:extLst>
+              <a:ext uri="{28A0092B-C50C-407E-A947-70E740481C1C}">
+                <a14:useLocalDpi xmlns:a14="http://schemas.microsoft.com/office/drawing/2010/main" val="0"/>
+              </a:ext>
+            </a:extLst>
+          </a:blip>
+          <a:stretch>
+            <a:fillRect/>
+          </a:stretch>
+        </p:blipFill>
+        <p:spPr bwMode="auto">
+          <a:xfrm>
+            <a:off x="3179522" y="740359"/>
+            <a:ext cx="3178325" cy="3178325"/>
+          </a:xfrm>
+          <a:prstGeom prst="roundRect">
+            <a:avLst>
+              <a:gd name="adj" fmla="val 0"/>
+            </a:avLst>
+          </a:prstGeom>
+          <a:noFill/>
+          <a:ln w="82550" cap="sq">
+            <a:noFill/>
+            <a:miter lim="800000"/>
+          </a:ln>
+          <a:effectLst/>
+          <a:extLst>
+            <a:ext uri="{909E8E84-426E-40DD-AFC4-6F175D3DCCD1}">
+              <a14:hiddenFill xmlns:a14="http://schemas.microsoft.com/office/drawing/2010/main">
+                <a:solidFill>
+                  <a:srgbClr val="FFFFFF"/>
+                </a:solidFill>
+              </a14:hiddenFill>
+            </a:ext>
+          </a:extLst>
+        </p:spPr>
+      </p:pic>
+      <p:pic>
+        <p:nvPicPr>
+          <p:cNvPr id="1028" name="Picture 4" descr="Blue the Velociraptor PRINT from Jurassic World Fallen Kingdom | Etsy Polska">
+            <a:extLst>
+              <a:ext uri="{FF2B5EF4-FFF2-40B4-BE49-F238E27FC236}">
+                <a16:creationId xmlns:a16="http://schemas.microsoft.com/office/drawing/2014/main" id="{FCA37E3D-BABD-A057-1C83-694EE79F6971}"/>
+              </a:ext>
+            </a:extLst>
+          </p:cNvPr>
+          <p:cNvPicPr>
+            <a:picLocks noChangeAspect="1" noChangeArrowheads="1"/>
+          </p:cNvPicPr>
+          <p:nvPr/>
+        </p:nvPicPr>
+        <p:blipFill>
+          <a:blip r:embed="rId5">
+            <a:extLst>
+              <a:ext uri="{28A0092B-C50C-407E-A947-70E740481C1C}">
+                <a14:useLocalDpi xmlns:a14="http://schemas.microsoft.com/office/drawing/2010/main" val="0"/>
+              </a:ext>
+            </a:extLst>
+          </a:blip>
+          <a:stretch>
+            <a:fillRect/>
+          </a:stretch>
+        </p:blipFill>
+        <p:spPr bwMode="auto">
+          <a:xfrm>
+            <a:off x="5906715" y="976245"/>
+            <a:ext cx="3254594" cy="2864041"/>
+          </a:xfrm>
+          <a:prstGeom prst="roundRect">
+            <a:avLst>
+              <a:gd name="adj" fmla="val 0"/>
+            </a:avLst>
+          </a:prstGeom>
+          <a:noFill/>
+          <a:ln w="82550" cap="sq">
+            <a:noFill/>
+            <a:miter lim="800000"/>
+          </a:ln>
+          <a:effectLst/>
+          <a:extLst>
+            <a:ext uri="{909E8E84-426E-40DD-AFC4-6F175D3DCCD1}">
+              <a14:hiddenFill xmlns:a14="http://schemas.microsoft.com/office/drawing/2010/main">
+                <a:solidFill>
+                  <a:srgbClr val="FFFFFF"/>
+                </a:solidFill>
+              </a14:hiddenFill>
+            </a:ext>
+          </a:extLst>
+        </p:spPr>
+      </p:pic>
+      <p:pic>
+        <p:nvPicPr>
+          <p:cNvPr id="1032" name="Picture 8" descr="Metamfetamina Vector Art Stock Images | Depositphotos">
+            <a:extLst>
+              <a:ext uri="{FF2B5EF4-FFF2-40B4-BE49-F238E27FC236}">
+                <a16:creationId xmlns:a16="http://schemas.microsoft.com/office/drawing/2014/main" id="{B2D6B645-89F8-ECCD-0CAC-8E87A4A8E4ED}"/>
+              </a:ext>
+            </a:extLst>
+          </p:cNvPr>
+          <p:cNvPicPr>
+            <a:picLocks noChangeAspect="1" noChangeArrowheads="1"/>
+          </p:cNvPicPr>
+          <p:nvPr/>
+        </p:nvPicPr>
+        <p:blipFill>
+          <a:blip r:embed="rId6">
+            <a:extLst>
+              <a:ext uri="{28A0092B-C50C-407E-A947-70E740481C1C}">
+                <a14:useLocalDpi xmlns:a14="http://schemas.microsoft.com/office/drawing/2010/main" val="0"/>
+              </a:ext>
+            </a:extLst>
+          </a:blip>
+          <a:stretch>
+            <a:fillRect/>
+          </a:stretch>
+        </p:blipFill>
+        <p:spPr bwMode="auto">
+          <a:xfrm>
+            <a:off x="8952777" y="1904301"/>
+            <a:ext cx="2325449" cy="1209233"/>
+          </a:xfrm>
+          <a:prstGeom prst="roundRect">
+            <a:avLst>
+              <a:gd name="adj" fmla="val 0"/>
+            </a:avLst>
+          </a:prstGeom>
+          <a:noFill/>
+          <a:ln w="82550" cap="sq">
+            <a:noFill/>
+            <a:miter lim="800000"/>
+          </a:ln>
+          <a:effectLst/>
+          <a:extLst>
+            <a:ext uri="{909E8E84-426E-40DD-AFC4-6F175D3DCCD1}">
+              <a14:hiddenFill xmlns:a14="http://schemas.microsoft.com/office/drawing/2010/main">
+                <a:solidFill>
+                  <a:srgbClr val="FFFFFF"/>
+                </a:solidFill>
+              </a14:hiddenFill>
+            </a:ext>
+          </a:extLst>
+        </p:spPr>
+      </p:pic>
+      <p:pic>
+        <p:nvPicPr>
+          <p:cNvPr id="1047" name="Picture 1046">
+            <a:extLst>
+              <a:ext uri="{FF2B5EF4-FFF2-40B4-BE49-F238E27FC236}">
+                <a16:creationId xmlns:a16="http://schemas.microsoft.com/office/drawing/2014/main" id="{7FF1EE29-26EE-44DB-A2DA-6298E8470CEE}"/>
+              </a:ext>
+              <a:ext uri="{C183D7F6-B498-43B3-948B-1728B52AA6E4}">
+                <adec:decorative xmlns:adec="http://schemas.microsoft.com/office/drawing/2017/decorative" val="1"/>
+              </a:ext>
+            </a:extLst>
+          </p:cNvPr>
+          <p:cNvPicPr>
+            <a:picLocks noGrp="1" noRot="1" noChangeAspect="1" noMove="1" noResize="1" noEditPoints="1" noAdjustHandles="1" noChangeArrowheads="1" noChangeShapeType="1" noCrop="1"/>
+          </p:cNvPicPr>
+          <p:nvPr>
+            <p:extLst>
+              <p:ext uri="{386F3935-93C4-4BCD-93E2-E3B085C9AB24}">
+                <p16:designElem xmlns:p16="http://schemas.microsoft.com/office/powerpoint/2015/main" val="1"/>
+              </p:ext>
+            </p:extLst>
+          </p:nvPr>
+        </p:nvPicPr>
+        <p:blipFill rotWithShape="1">
+          <a:blip r:embed="rId3">
+            <a:extLst>
+              <a:ext uri="{28A0092B-C50C-407E-A947-70E740481C1C}">
+                <a14:useLocalDpi xmlns:a14="http://schemas.microsoft.com/office/drawing/2010/main" val="0"/>
+              </a:ext>
+            </a:extLst>
+          </a:blip>
+          <a:srcRect l="69764" t="46543"/>
+          <a:stretch/>
+        </p:blipFill>
+        <p:spPr>
+          <a:xfrm>
+            <a:off x="8500434" y="3191932"/>
+            <a:ext cx="3686351" cy="3666067"/>
+          </a:xfrm>
+          <a:prstGeom prst="rect">
+            <a:avLst/>
+          </a:prstGeom>
+        </p:spPr>
+      </p:pic>
+      <p:sp>
+        <p:nvSpPr>
+          <p:cNvPr id="2" name="Tytuł 1">
+            <a:extLst>
+              <a:ext uri="{FF2B5EF4-FFF2-40B4-BE49-F238E27FC236}">
+                <a16:creationId xmlns:a16="http://schemas.microsoft.com/office/drawing/2014/main" id="{21A8541B-2324-8870-1D5C-1FF8F14EF687}"/>
+              </a:ext>
+            </a:extLst>
+          </p:cNvPr>
+          <p:cNvSpPr>
+            <a:spLocks noGrp="1"/>
+          </p:cNvSpPr>
+          <p:nvPr>
+            <p:ph type="title"/>
+          </p:nvPr>
+        </p:nvSpPr>
+        <p:spPr>
+          <a:xfrm>
+            <a:off x="635211" y="4562855"/>
+            <a:ext cx="10916365" cy="1137554"/>
+          </a:xfrm>
+        </p:spPr>
+        <p:txBody>
+          <a:bodyPr vert="horz" lIns="91440" tIns="45720" rIns="91440" bIns="45720" rtlCol="0" anchor="b">
+            <a:normAutofit/>
+          </a:bodyPr>
+          <a:lstStyle/>
+          <a:p>
+            <a:r>
+              <a:rPr lang="en-US" sz="4800"/>
+              <a:t>Czym jest Las Wiedzma’s?</a:t>
+            </a:r>
+          </a:p>
+        </p:txBody>
+      </p:sp>
+      <p:pic>
+        <p:nvPicPr>
+          <p:cNvPr id="1049" name="Picture 1048">
+            <a:extLst>
+              <a:ext uri="{FF2B5EF4-FFF2-40B4-BE49-F238E27FC236}">
+                <a16:creationId xmlns:a16="http://schemas.microsoft.com/office/drawing/2014/main" id="{12EC82D8-77B2-423C-8501-A4DBC6F6C1A5}"/>
+              </a:ext>
+              <a:ext uri="{C183D7F6-B498-43B3-948B-1728B52AA6E4}">
+                <adec:decorative xmlns:adec="http://schemas.microsoft.com/office/drawing/2017/decorative" val="1"/>
+              </a:ext>
+            </a:extLst>
+          </p:cNvPr>
+          <p:cNvPicPr>
+            <a:picLocks noGrp="1" noRot="1" noChangeAspect="1" noMove="1" noResize="1" noEditPoints="1" noAdjustHandles="1" noChangeArrowheads="1" noChangeShapeType="1" noCrop="1"/>
+          </p:cNvPicPr>
+          <p:nvPr>
+            <p:extLst>
+              <p:ext uri="{386F3935-93C4-4BCD-93E2-E3B085C9AB24}">
+                <p16:designElem xmlns:p16="http://schemas.microsoft.com/office/powerpoint/2015/main" val="1"/>
+              </p:ext>
+            </p:extLst>
+          </p:nvPr>
+        </p:nvPicPr>
+        <p:blipFill rotWithShape="1">
+          <a:blip r:embed="rId3">
+            <a:extLst>
+              <a:ext uri="{28A0092B-C50C-407E-A947-70E740481C1C}">
+                <a14:useLocalDpi xmlns:a14="http://schemas.microsoft.com/office/drawing/2010/main" val="0"/>
+              </a:ext>
+            </a:extLst>
+          </a:blip>
+          <a:srcRect b="55478"/>
+          <a:stretch/>
+        </p:blipFill>
+        <p:spPr>
+          <a:xfrm>
+            <a:off x="-2607" y="0"/>
+            <a:ext cx="12192000" cy="3053351"/>
+          </a:xfrm>
+          <a:prstGeom prst="rect">
+            <a:avLst/>
+          </a:prstGeom>
+        </p:spPr>
+      </p:pic>
+      <p:pic>
+        <p:nvPicPr>
+          <p:cNvPr id="1030" name="Picture 6" descr="kolorowanka wiedzma H I , rysunek do druku wiedzma H I">
+            <a:extLst>
+              <a:ext uri="{FF2B5EF4-FFF2-40B4-BE49-F238E27FC236}">
+                <a16:creationId xmlns:a16="http://schemas.microsoft.com/office/drawing/2014/main" id="{B6CD71FA-5256-1727-386C-EE47801CE75F}"/>
+              </a:ext>
+            </a:extLst>
+          </p:cNvPr>
+          <p:cNvPicPr>
+            <a:picLocks noChangeAspect="1" noChangeArrowheads="1"/>
+          </p:cNvPicPr>
+          <p:nvPr/>
+        </p:nvPicPr>
+        <p:blipFill>
+          <a:blip r:embed="rId7">
+            <a:extLst>
+              <a:ext uri="{28A0092B-C50C-407E-A947-70E740481C1C}">
+                <a14:useLocalDpi xmlns:a14="http://schemas.microsoft.com/office/drawing/2010/main" val="0"/>
+              </a:ext>
+            </a:extLst>
+          </a:blip>
+          <a:stretch>
+            <a:fillRect/>
+          </a:stretch>
+        </p:blipFill>
+        <p:spPr bwMode="auto">
+          <a:xfrm>
+            <a:off x="1080082" y="740360"/>
+            <a:ext cx="2388690" cy="3311055"/>
+          </a:xfrm>
+          <a:prstGeom prst="roundRect">
+            <a:avLst>
+              <a:gd name="adj" fmla="val 0"/>
+            </a:avLst>
+          </a:prstGeom>
+          <a:noFill/>
+          <a:ln w="82550" cap="sq">
+            <a:noFill/>
+            <a:miter lim="800000"/>
+          </a:ln>
+          <a:effectLst/>
+          <a:extLst>
+            <a:ext uri="{909E8E84-426E-40DD-AFC4-6F175D3DCCD1}">
+              <a14:hiddenFill xmlns:a14="http://schemas.microsoft.com/office/drawing/2010/main">
+                <a:solidFill>
+                  <a:srgbClr val="FFFFFF"/>
+                </a:solidFill>
+              </a14:hiddenFill>
+            </a:ext>
+          </a:extLst>
+        </p:spPr>
+      </p:pic>
+    </p:spTree>
+    <p:extLst>
+      <p:ext uri="{BB962C8B-B14F-4D97-AF65-F5344CB8AC3E}">
+        <p14:creationId xmlns:p14="http://schemas.microsoft.com/office/powerpoint/2010/main" val="2029695960"/>
+      </p:ext>
+    </p:extLst>
+  </p:cSld>
+  <p:clrMapOvr>
+    <a:masterClrMapping/>
+  </p:clrMapOvr>
+  <mc:AlternateContent xmlns:mc="http://schemas.openxmlformats.org/markup-compatibility/2006">
+    <mc:Choice xmlns:p159="http://schemas.microsoft.com/office/powerpoint/2015/09/main" Requires="p159">
+      <p:transition spd="slow">
+        <p159:morph option="byObject"/>
+      </p:transition>
+    </mc:Choice>
+    <mc:Fallback>
+      <p:transition spd="slow">
+        <p:fade/>
+      </p:transition>
+    </mc:Fallback>
+  </mc:AlternateContent>
+</p:sld>
+</file>
+
+<file path=ppt/slides/slide4.xml><?xml version="1.0" encoding="utf-8"?>
 <p:sld xmlns:a="http://schemas.openxmlformats.org/drawingml/2006/main" xmlns:r="http://schemas.openxmlformats.org/officeDocument/2006/relationships" xmlns:p="http://schemas.openxmlformats.org/presentationml/2006/main">
   <p:cSld>
     <p:spTree>
@@ -14951,10 +16670,22 @@
   <p:clrMapOvr>
     <a:masterClrMapping/>
   </p:clrMapOvr>
+  <mc:AlternateContent xmlns:mc="http://schemas.openxmlformats.org/markup-compatibility/2006">
+    <mc:Choice xmlns:p159="http://schemas.microsoft.com/office/powerpoint/2015/09/main" Requires="p159">
+      <p:transition spd="slow">
+        <p159:morph option="byObject"/>
+      </p:transition>
+    </mc:Choice>
+    <mc:Fallback>
+      <p:transition spd="slow">
+        <p:fade/>
+      </p:transition>
+    </mc:Fallback>
+  </mc:AlternateContent>
 </p:sld>
 </file>
 
-<file path=ppt/slides/slide4.xml><?xml version="1.0" encoding="utf-8"?>
+<file path=ppt/slides/slide5.xml><?xml version="1.0" encoding="utf-8"?>
 <p:sld xmlns:a="http://schemas.openxmlformats.org/drawingml/2006/main" xmlns:r="http://schemas.openxmlformats.org/officeDocument/2006/relationships" xmlns:p="http://schemas.openxmlformats.org/presentationml/2006/main">
   <p:cSld>
     <p:spTree>
@@ -15011,10 +16742,22 @@
   <p:clrMapOvr>
     <a:masterClrMapping/>
   </p:clrMapOvr>
+  <mc:AlternateContent xmlns:mc="http://schemas.openxmlformats.org/markup-compatibility/2006">
+    <mc:Choice xmlns:p159="http://schemas.microsoft.com/office/powerpoint/2015/09/main" Requires="p159">
+      <p:transition spd="slow">
+        <p159:morph option="byObject"/>
+      </p:transition>
+    </mc:Choice>
+    <mc:Fallback>
+      <p:transition spd="slow">
+        <p:fade/>
+      </p:transition>
+    </mc:Fallback>
+  </mc:AlternateContent>
 </p:sld>
 </file>
 
-<file path=ppt/slides/slide5.xml><?xml version="1.0" encoding="utf-8"?>
+<file path=ppt/slides/slide6.xml><?xml version="1.0" encoding="utf-8"?>
 <p:sld xmlns:a="http://schemas.openxmlformats.org/drawingml/2006/main" xmlns:r="http://schemas.openxmlformats.org/officeDocument/2006/relationships" xmlns:p="http://schemas.openxmlformats.org/presentationml/2006/main">
   <p:cSld>
     <p:spTree>
@@ -15627,10 +17370,22 @@
   <p:clrMapOvr>
     <a:masterClrMapping/>
   </p:clrMapOvr>
+  <mc:AlternateContent xmlns:mc="http://schemas.openxmlformats.org/markup-compatibility/2006">
+    <mc:Choice xmlns:p159="http://schemas.microsoft.com/office/powerpoint/2015/09/main" Requires="p159">
+      <p:transition spd="slow">
+        <p159:morph option="byObject"/>
+      </p:transition>
+    </mc:Choice>
+    <mc:Fallback>
+      <p:transition spd="slow">
+        <p:fade/>
+      </p:transition>
+    </mc:Fallback>
+  </mc:AlternateContent>
 </p:sld>
 </file>
 
-<file path=ppt/slides/slide6.xml><?xml version="1.0" encoding="utf-8"?>
+<file path=ppt/slides/slide7.xml><?xml version="1.0" encoding="utf-8"?>
 <p:sld xmlns:a="http://schemas.openxmlformats.org/drawingml/2006/main" xmlns:r="http://schemas.openxmlformats.org/officeDocument/2006/relationships" xmlns:p="http://schemas.openxmlformats.org/presentationml/2006/main">
   <p:cSld>
     <p:spTree>
@@ -15687,10 +17442,22 @@
   <p:clrMapOvr>
     <a:masterClrMapping/>
   </p:clrMapOvr>
+  <mc:AlternateContent xmlns:mc="http://schemas.openxmlformats.org/markup-compatibility/2006">
+    <mc:Choice xmlns:p159="http://schemas.microsoft.com/office/powerpoint/2015/09/main" Requires="p159">
+      <p:transition spd="slow">
+        <p159:morph option="byObject"/>
+      </p:transition>
+    </mc:Choice>
+    <mc:Fallback>
+      <p:transition spd="slow">
+        <p:fade/>
+      </p:transition>
+    </mc:Fallback>
+  </mc:AlternateContent>
 </p:sld>
 </file>
 
-<file path=ppt/slides/slide7.xml><?xml version="1.0" encoding="utf-8"?>
+<file path=ppt/slides/slide8.xml><?xml version="1.0" encoding="utf-8"?>
 <p:sld xmlns:a="http://schemas.openxmlformats.org/drawingml/2006/main" xmlns:r="http://schemas.openxmlformats.org/officeDocument/2006/relationships" xmlns:p="http://schemas.openxmlformats.org/presentationml/2006/main">
   <p:cSld>
     <p:spTree>
@@ -16303,10 +18070,22 @@
   <p:clrMapOvr>
     <a:masterClrMapping/>
   </p:clrMapOvr>
+  <mc:AlternateContent xmlns:mc="http://schemas.openxmlformats.org/markup-compatibility/2006">
+    <mc:Choice xmlns:p159="http://schemas.microsoft.com/office/powerpoint/2015/09/main" Requires="p159">
+      <p:transition spd="slow">
+        <p159:morph option="byObject"/>
+      </p:transition>
+    </mc:Choice>
+    <mc:Fallback>
+      <p:transition spd="slow">
+        <p:fade/>
+      </p:transition>
+    </mc:Fallback>
+  </mc:AlternateContent>
 </p:sld>
 </file>
 
-<file path=ppt/slides/slide8.xml><?xml version="1.0" encoding="utf-8"?>
+<file path=ppt/slides/slide9.xml><?xml version="1.0" encoding="utf-8"?>
 <p:sld xmlns:a="http://schemas.openxmlformats.org/drawingml/2006/main" xmlns:r="http://schemas.openxmlformats.org/officeDocument/2006/relationships" xmlns:p="http://schemas.openxmlformats.org/presentationml/2006/main">
   <p:cSld>
     <p:spTree>
@@ -16363,621 +18142,18 @@
   <p:clrMapOvr>
     <a:masterClrMapping/>
   </p:clrMapOvr>
-</p:sld>
-</file>
-
-<file path=ppt/slides/slide9.xml><?xml version="1.0" encoding="utf-8"?>
-<p:sld xmlns:a="http://schemas.openxmlformats.org/drawingml/2006/main" xmlns:r="http://schemas.openxmlformats.org/officeDocument/2006/relationships" xmlns:p="http://schemas.openxmlformats.org/presentationml/2006/main">
-  <p:cSld>
-    <p:spTree>
-      <p:nvGrpSpPr>
-        <p:cNvPr id="1" name=""/>
-        <p:cNvGrpSpPr/>
-        <p:nvPr/>
-      </p:nvGrpSpPr>
-      <p:grpSpPr>
-        <a:xfrm>
-          <a:off x="0" y="0"/>
-          <a:ext cx="0" cy="0"/>
-          <a:chOff x="0" y="0"/>
-          <a:chExt cx="0" cy="0"/>
-        </a:xfrm>
-      </p:grpSpPr>
-      <p:sp>
-        <p:nvSpPr>
-          <p:cNvPr id="2" name="Tytuł 1">
-            <a:extLst>
-              <a:ext uri="{FF2B5EF4-FFF2-40B4-BE49-F238E27FC236}">
-                <a16:creationId xmlns:a16="http://schemas.microsoft.com/office/drawing/2014/main" id="{F4ABE5A0-312E-D7EE-FBF2-46D9B8377363}"/>
-              </a:ext>
-            </a:extLst>
-          </p:cNvPr>
-          <p:cNvSpPr>
-            <a:spLocks noGrp="1"/>
-          </p:cNvSpPr>
-          <p:nvPr>
-            <p:ph type="title"/>
-          </p:nvPr>
-        </p:nvSpPr>
-        <p:spPr>
-          <a:xfrm>
-            <a:off x="913773" y="250379"/>
-            <a:ext cx="10364451" cy="1596177"/>
-          </a:xfrm>
-        </p:spPr>
-        <p:txBody>
-          <a:bodyPr/>
-          <a:lstStyle/>
-          <a:p>
-            <a:r>
-              <a:rPr lang="pl-PL" dirty="0"/>
-              <a:t>Wariant zbilansowany – ustawienia domyślne</a:t>
-            </a:r>
-          </a:p>
-        </p:txBody>
-      </p:sp>
-      <p:graphicFrame>
-        <p:nvGraphicFramePr>
-          <p:cNvPr id="4" name="Tabela 3">
-            <a:extLst>
-              <a:ext uri="{FF2B5EF4-FFF2-40B4-BE49-F238E27FC236}">
-                <a16:creationId xmlns:a16="http://schemas.microsoft.com/office/drawing/2014/main" id="{A0C88312-C6A3-30F5-4652-648EF21CB3C4}"/>
-              </a:ext>
-            </a:extLst>
-          </p:cNvPr>
-          <p:cNvGraphicFramePr>
-            <a:graphicFrameLocks noGrp="1"/>
-          </p:cNvGraphicFramePr>
-          <p:nvPr>
-            <p:extLst>
-              <p:ext uri="{D42A27DB-BD31-4B8C-83A1-F6EECF244321}">
-                <p14:modId xmlns:p14="http://schemas.microsoft.com/office/powerpoint/2010/main" val="3384900101"/>
-              </p:ext>
-            </p:extLst>
-          </p:nvPr>
-        </p:nvGraphicFramePr>
-        <p:xfrm>
-          <a:off x="3348134" y="1690688"/>
-          <a:ext cx="5495731" cy="4916933"/>
-        </p:xfrm>
-        <a:graphic>
-          <a:graphicData uri="http://schemas.openxmlformats.org/drawingml/2006/table">
-            <a:tbl>
-              <a:tblPr>
-                <a:tableStyleId>{616DA210-FB5B-4158-B5E0-FEB733F419BA}</a:tableStyleId>
-              </a:tblPr>
-              <a:tblGrid>
-                <a:gridCol w="4307464">
-                  <a:extLst>
-                    <a:ext uri="{9D8B030D-6E8A-4147-A177-3AD203B41FA5}">
-                      <a16:colId xmlns:a16="http://schemas.microsoft.com/office/drawing/2014/main" val="4184483721"/>
-                    </a:ext>
-                  </a:extLst>
-                </a:gridCol>
-                <a:gridCol w="1188267">
-                  <a:extLst>
-                    <a:ext uri="{9D8B030D-6E8A-4147-A177-3AD203B41FA5}">
-                      <a16:colId xmlns:a16="http://schemas.microsoft.com/office/drawing/2014/main" val="325871312"/>
-                    </a:ext>
-                  </a:extLst>
-                </a:gridCol>
-              </a:tblGrid>
-              <a:tr h="461424">
-                <a:tc gridSpan="2">
-                  <a:txBody>
-                    <a:bodyPr/>
-                    <a:lstStyle/>
-                    <a:p>
-                      <a:pPr algn="ctr" fontAlgn="b"/>
-                      <a:r>
-                        <a:rPr lang="pl-PL" sz="2400" u="none" strike="noStrike" dirty="0">
-                          <a:effectLst/>
-                        </a:rPr>
-                        <a:t>Ustawienia</a:t>
-                      </a:r>
-                      <a:endParaRPr lang="pl-PL" sz="2400" b="0" i="0" u="none" strike="noStrike" dirty="0">
-                        <a:solidFill>
-                          <a:srgbClr val="000000"/>
-                        </a:solidFill>
-                        <a:effectLst/>
-                        <a:latin typeface="Calibri" panose="020F0502020204030204" pitchFamily="34" charset="0"/>
-                      </a:endParaRPr>
-                    </a:p>
-                  </a:txBody>
-                  <a:tcPr marL="9525" marR="9525" marT="9525" marB="0" anchor="b"/>
-                </a:tc>
-                <a:tc hMerge="1">
-                  <a:txBody>
-                    <a:bodyPr/>
-                    <a:lstStyle/>
-                    <a:p>
-                      <a:endParaRPr lang="pl-PL"/>
-                    </a:p>
-                  </a:txBody>
-                  <a:tcPr/>
-                </a:tc>
-                <a:extLst>
-                  <a:ext uri="{0D108BD9-81ED-4DB2-BD59-A6C34878D82A}">
-                    <a16:rowId xmlns:a16="http://schemas.microsoft.com/office/drawing/2014/main" val="1249242128"/>
-                  </a:ext>
-                </a:extLst>
-              </a:tr>
-              <a:tr h="461424">
-                <a:tc>
-                  <a:txBody>
-                    <a:bodyPr/>
-                    <a:lstStyle/>
-                    <a:p>
-                      <a:pPr algn="l" fontAlgn="b"/>
-                      <a:r>
-                        <a:rPr lang="pl-PL" sz="2400" u="none" strike="noStrike" dirty="0">
-                          <a:effectLst/>
-                        </a:rPr>
-                        <a:t>Rozmiar</a:t>
-                      </a:r>
-                      <a:endParaRPr lang="pl-PL" sz="2400" b="0" i="0" u="none" strike="noStrike" dirty="0">
-                        <a:solidFill>
-                          <a:srgbClr val="000000"/>
-                        </a:solidFill>
-                        <a:effectLst/>
-                        <a:latin typeface="Calibri" panose="020F0502020204030204" pitchFamily="34" charset="0"/>
-                      </a:endParaRPr>
-                    </a:p>
-                  </a:txBody>
-                  <a:tcPr marL="9525" marR="9525" marT="9525" marB="0" anchor="b"/>
-                </a:tc>
-                <a:tc>
-                  <a:txBody>
-                    <a:bodyPr/>
-                    <a:lstStyle/>
-                    <a:p>
-                      <a:pPr algn="ctr" fontAlgn="b"/>
-                      <a:r>
-                        <a:rPr lang="pl-PL" sz="2400" b="0" i="0" u="none" strike="noStrike">
-                          <a:solidFill>
-                            <a:srgbClr val="000000"/>
-                          </a:solidFill>
-                          <a:effectLst/>
-                          <a:latin typeface="Calibri" panose="020F0502020204030204" pitchFamily="34" charset="0"/>
-                        </a:rPr>
-                        <a:t>40</a:t>
-                      </a:r>
-                    </a:p>
-                  </a:txBody>
-                  <a:tcPr marL="9525" marR="9525" marT="9525" marB="0" anchor="b"/>
-                </a:tc>
-                <a:extLst>
-                  <a:ext uri="{0D108BD9-81ED-4DB2-BD59-A6C34878D82A}">
-                    <a16:rowId xmlns:a16="http://schemas.microsoft.com/office/drawing/2014/main" val="2734115141"/>
-                  </a:ext>
-                </a:extLst>
-              </a:tr>
-              <a:tr h="461424">
-                <a:tc>
-                  <a:txBody>
-                    <a:bodyPr/>
-                    <a:lstStyle/>
-                    <a:p>
-                      <a:pPr algn="l" fontAlgn="b"/>
-                      <a:r>
-                        <a:rPr lang="pl-PL" sz="2400" u="none" strike="noStrike" dirty="0" err="1">
-                          <a:effectLst/>
-                        </a:rPr>
-                        <a:t>Zajace</a:t>
-                      </a:r>
-                      <a:endParaRPr lang="pl-PL" sz="2400" b="0" i="0" u="none" strike="noStrike" dirty="0">
-                        <a:solidFill>
-                          <a:srgbClr val="000000"/>
-                        </a:solidFill>
-                        <a:effectLst/>
-                        <a:latin typeface="Calibri" panose="020F0502020204030204" pitchFamily="34" charset="0"/>
-                      </a:endParaRPr>
-                    </a:p>
-                  </a:txBody>
-                  <a:tcPr marL="9525" marR="9525" marT="9525" marB="0" anchor="b"/>
-                </a:tc>
-                <a:tc>
-                  <a:txBody>
-                    <a:bodyPr/>
-                    <a:lstStyle/>
-                    <a:p>
-                      <a:pPr algn="ctr" fontAlgn="b"/>
-                      <a:r>
-                        <a:rPr lang="pl-PL" sz="2400" b="0" i="0" u="none" strike="noStrike">
-                          <a:solidFill>
-                            <a:srgbClr val="000000"/>
-                          </a:solidFill>
-                          <a:effectLst/>
-                          <a:latin typeface="Calibri" panose="020F0502020204030204" pitchFamily="34" charset="0"/>
-                        </a:rPr>
-                        <a:t>15</a:t>
-                      </a:r>
-                    </a:p>
-                  </a:txBody>
-                  <a:tcPr marL="9525" marR="9525" marT="9525" marB="0" anchor="b"/>
-                </a:tc>
-                <a:extLst>
-                  <a:ext uri="{0D108BD9-81ED-4DB2-BD59-A6C34878D82A}">
-                    <a16:rowId xmlns:a16="http://schemas.microsoft.com/office/drawing/2014/main" val="2616257337"/>
-                  </a:ext>
-                </a:extLst>
-              </a:tr>
-              <a:tr h="461424">
-                <a:tc>
-                  <a:txBody>
-                    <a:bodyPr/>
-                    <a:lstStyle/>
-                    <a:p>
-                      <a:pPr algn="l" fontAlgn="b"/>
-                      <a:r>
-                        <a:rPr lang="pl-PL" sz="2400" u="none" strike="noStrike" dirty="0" err="1">
-                          <a:effectLst/>
-                        </a:rPr>
-                        <a:t>Welociraptory</a:t>
-                      </a:r>
-                      <a:endParaRPr lang="pl-PL" sz="2400" b="0" i="0" u="none" strike="noStrike" dirty="0">
-                        <a:solidFill>
-                          <a:srgbClr val="000000"/>
-                        </a:solidFill>
-                        <a:effectLst/>
-                        <a:latin typeface="Calibri" panose="020F0502020204030204" pitchFamily="34" charset="0"/>
-                      </a:endParaRPr>
-                    </a:p>
-                  </a:txBody>
-                  <a:tcPr marL="9525" marR="9525" marT="9525" marB="0" anchor="b"/>
-                </a:tc>
-                <a:tc>
-                  <a:txBody>
-                    <a:bodyPr/>
-                    <a:lstStyle/>
-                    <a:p>
-                      <a:pPr algn="ctr" fontAlgn="b"/>
-                      <a:r>
-                        <a:rPr lang="pl-PL" sz="2400" b="0" i="0" u="none" strike="noStrike">
-                          <a:solidFill>
-                            <a:srgbClr val="000000"/>
-                          </a:solidFill>
-                          <a:effectLst/>
-                          <a:latin typeface="Calibri" panose="020F0502020204030204" pitchFamily="34" charset="0"/>
-                        </a:rPr>
-                        <a:t>15</a:t>
-                      </a:r>
-                    </a:p>
-                  </a:txBody>
-                  <a:tcPr marL="9525" marR="9525" marT="9525" marB="0" anchor="b"/>
-                </a:tc>
-                <a:extLst>
-                  <a:ext uri="{0D108BD9-81ED-4DB2-BD59-A6C34878D82A}">
-                    <a16:rowId xmlns:a16="http://schemas.microsoft.com/office/drawing/2014/main" val="719442360"/>
-                  </a:ext>
-                </a:extLst>
-              </a:tr>
-              <a:tr h="461424">
-                <a:tc>
-                  <a:txBody>
-                    <a:bodyPr/>
-                    <a:lstStyle/>
-                    <a:p>
-                      <a:pPr algn="l" fontAlgn="b"/>
-                      <a:r>
-                        <a:rPr lang="pl-PL" sz="2400" u="none" strike="noStrike">
-                          <a:effectLst/>
-                        </a:rPr>
-                        <a:t>Owoce Rozkoszy</a:t>
-                      </a:r>
-                      <a:endParaRPr lang="pl-PL" sz="2400" b="0" i="0" u="none" strike="noStrike">
-                        <a:solidFill>
-                          <a:srgbClr val="000000"/>
-                        </a:solidFill>
-                        <a:effectLst/>
-                        <a:latin typeface="Calibri" panose="020F0502020204030204" pitchFamily="34" charset="0"/>
-                      </a:endParaRPr>
-                    </a:p>
-                  </a:txBody>
-                  <a:tcPr marL="9525" marR="9525" marT="9525" marB="0" anchor="b"/>
-                </a:tc>
-                <a:tc>
-                  <a:txBody>
-                    <a:bodyPr/>
-                    <a:lstStyle/>
-                    <a:p>
-                      <a:pPr algn="ctr" fontAlgn="b"/>
-                      <a:r>
-                        <a:rPr lang="pl-PL" sz="2400" b="0" i="0" u="none" strike="noStrike">
-                          <a:solidFill>
-                            <a:srgbClr val="000000"/>
-                          </a:solidFill>
-                          <a:effectLst/>
-                          <a:latin typeface="Calibri" panose="020F0502020204030204" pitchFamily="34" charset="0"/>
-                        </a:rPr>
-                        <a:t>30</a:t>
-                      </a:r>
-                    </a:p>
-                  </a:txBody>
-                  <a:tcPr marL="9525" marR="9525" marT="9525" marB="0" anchor="b"/>
-                </a:tc>
-                <a:extLst>
-                  <a:ext uri="{0D108BD9-81ED-4DB2-BD59-A6C34878D82A}">
-                    <a16:rowId xmlns:a16="http://schemas.microsoft.com/office/drawing/2014/main" val="2679973117"/>
-                  </a:ext>
-                </a:extLst>
-              </a:tr>
-              <a:tr h="461424">
-                <a:tc>
-                  <a:txBody>
-                    <a:bodyPr/>
-                    <a:lstStyle/>
-                    <a:p>
-                      <a:pPr algn="l" fontAlgn="b"/>
-                      <a:r>
-                        <a:rPr lang="pl-PL" sz="2400" u="none" strike="noStrike" dirty="0">
-                          <a:effectLst/>
-                        </a:rPr>
-                        <a:t>Szansa na przedawkowanie </a:t>
-                      </a:r>
-                      <a:r>
-                        <a:rPr lang="pl-PL" sz="2400" u="none" strike="noStrike" dirty="0" err="1">
-                          <a:effectLst/>
-                        </a:rPr>
-                        <a:t>zajaca</a:t>
-                      </a:r>
-                      <a:endParaRPr lang="pl-PL" sz="2400" b="0" i="0" u="none" strike="noStrike" dirty="0">
-                        <a:solidFill>
-                          <a:srgbClr val="000000"/>
-                        </a:solidFill>
-                        <a:effectLst/>
-                        <a:latin typeface="Calibri" panose="020F0502020204030204" pitchFamily="34" charset="0"/>
-                      </a:endParaRPr>
-                    </a:p>
-                  </a:txBody>
-                  <a:tcPr marL="9525" marR="9525" marT="9525" marB="0" anchor="b"/>
-                </a:tc>
-                <a:tc>
-                  <a:txBody>
-                    <a:bodyPr/>
-                    <a:lstStyle/>
-                    <a:p>
-                      <a:pPr algn="ctr" fontAlgn="b"/>
-                      <a:r>
-                        <a:rPr lang="pl-PL" sz="2400" b="0" i="0" u="none" strike="noStrike">
-                          <a:solidFill>
-                            <a:srgbClr val="000000"/>
-                          </a:solidFill>
-                          <a:effectLst/>
-                          <a:latin typeface="Calibri" panose="020F0502020204030204" pitchFamily="34" charset="0"/>
-                        </a:rPr>
-                        <a:t>1</a:t>
-                      </a:r>
-                    </a:p>
-                  </a:txBody>
-                  <a:tcPr marL="9525" marR="9525" marT="9525" marB="0" anchor="b"/>
-                </a:tc>
-                <a:extLst>
-                  <a:ext uri="{0D108BD9-81ED-4DB2-BD59-A6C34878D82A}">
-                    <a16:rowId xmlns:a16="http://schemas.microsoft.com/office/drawing/2014/main" val="359944270"/>
-                  </a:ext>
-                </a:extLst>
-              </a:tr>
-              <a:tr h="461424">
-                <a:tc>
-                  <a:txBody>
-                    <a:bodyPr/>
-                    <a:lstStyle/>
-                    <a:p>
-                      <a:pPr algn="l" fontAlgn="b"/>
-                      <a:r>
-                        <a:rPr lang="pl-PL" sz="2400" u="none" strike="noStrike" dirty="0">
-                          <a:effectLst/>
-                        </a:rPr>
-                        <a:t>Szansa na przed. </a:t>
-                      </a:r>
-                      <a:r>
-                        <a:rPr lang="pl-PL" sz="2400" u="none" strike="noStrike" dirty="0" err="1">
-                          <a:effectLst/>
-                        </a:rPr>
-                        <a:t>Welociraptora</a:t>
-                      </a:r>
-                      <a:endParaRPr lang="pl-PL" sz="2400" b="0" i="0" u="none" strike="noStrike" dirty="0">
-                        <a:solidFill>
-                          <a:srgbClr val="000000"/>
-                        </a:solidFill>
-                        <a:effectLst/>
-                        <a:latin typeface="Calibri" panose="020F0502020204030204" pitchFamily="34" charset="0"/>
-                      </a:endParaRPr>
-                    </a:p>
-                  </a:txBody>
-                  <a:tcPr marL="9525" marR="9525" marT="9525" marB="0" anchor="b"/>
-                </a:tc>
-                <a:tc>
-                  <a:txBody>
-                    <a:bodyPr/>
-                    <a:lstStyle/>
-                    <a:p>
-                      <a:pPr algn="ctr" fontAlgn="b"/>
-                      <a:r>
-                        <a:rPr lang="pl-PL" sz="2400" b="0" i="0" u="none" strike="noStrike">
-                          <a:solidFill>
-                            <a:srgbClr val="000000"/>
-                          </a:solidFill>
-                          <a:effectLst/>
-                          <a:latin typeface="Calibri" panose="020F0502020204030204" pitchFamily="34" charset="0"/>
-                        </a:rPr>
-                        <a:t>5</a:t>
-                      </a:r>
-                    </a:p>
-                  </a:txBody>
-                  <a:tcPr marL="9525" marR="9525" marT="9525" marB="0" anchor="b"/>
-                </a:tc>
-                <a:extLst>
-                  <a:ext uri="{0D108BD9-81ED-4DB2-BD59-A6C34878D82A}">
-                    <a16:rowId xmlns:a16="http://schemas.microsoft.com/office/drawing/2014/main" val="2884980630"/>
-                  </a:ext>
-                </a:extLst>
-              </a:tr>
-              <a:tr h="461424">
-                <a:tc>
-                  <a:txBody>
-                    <a:bodyPr/>
-                    <a:lstStyle/>
-                    <a:p>
-                      <a:pPr algn="l" fontAlgn="b"/>
-                      <a:r>
-                        <a:rPr lang="pl-PL" sz="2400" u="none" strike="noStrike" dirty="0">
-                          <a:effectLst/>
-                        </a:rPr>
-                        <a:t>Terytorium Wiedźmy</a:t>
-                      </a:r>
-                      <a:endParaRPr lang="pl-PL" sz="2400" b="0" i="0" u="none" strike="noStrike" dirty="0">
-                        <a:solidFill>
-                          <a:srgbClr val="000000"/>
-                        </a:solidFill>
-                        <a:effectLst/>
-                        <a:latin typeface="Calibri" panose="020F0502020204030204" pitchFamily="34" charset="0"/>
-                      </a:endParaRPr>
-                    </a:p>
-                  </a:txBody>
-                  <a:tcPr marL="9525" marR="9525" marT="9525" marB="0" anchor="b"/>
-                </a:tc>
-                <a:tc>
-                  <a:txBody>
-                    <a:bodyPr/>
-                    <a:lstStyle/>
-                    <a:p>
-                      <a:pPr algn="ctr" fontAlgn="b"/>
-                      <a:r>
-                        <a:rPr lang="pl-PL" sz="2400" b="0" i="0" u="none" strike="noStrike">
-                          <a:solidFill>
-                            <a:srgbClr val="000000"/>
-                          </a:solidFill>
-                          <a:effectLst/>
-                          <a:latin typeface="Calibri" panose="020F0502020204030204" pitchFamily="34" charset="0"/>
-                        </a:rPr>
-                        <a:t>15</a:t>
-                      </a:r>
-                    </a:p>
-                  </a:txBody>
-                  <a:tcPr marL="9525" marR="9525" marT="9525" marB="0" anchor="b"/>
-                </a:tc>
-                <a:extLst>
-                  <a:ext uri="{0D108BD9-81ED-4DB2-BD59-A6C34878D82A}">
-                    <a16:rowId xmlns:a16="http://schemas.microsoft.com/office/drawing/2014/main" val="2236162618"/>
-                  </a:ext>
-                </a:extLst>
-              </a:tr>
-              <a:tr h="461424">
-                <a:tc>
-                  <a:txBody>
-                    <a:bodyPr/>
-                    <a:lstStyle/>
-                    <a:p>
-                      <a:pPr algn="l" fontAlgn="b"/>
-                      <a:r>
-                        <a:rPr lang="pl-PL" sz="2400" u="none" strike="noStrike" dirty="0">
-                          <a:effectLst/>
-                        </a:rPr>
-                        <a:t>Szansa na wybuch wiedźmy</a:t>
-                      </a:r>
-                      <a:endParaRPr lang="pl-PL" sz="2400" b="0" i="0" u="none" strike="noStrike" dirty="0">
-                        <a:solidFill>
-                          <a:srgbClr val="000000"/>
-                        </a:solidFill>
-                        <a:effectLst/>
-                        <a:latin typeface="Calibri" panose="020F0502020204030204" pitchFamily="34" charset="0"/>
-                      </a:endParaRPr>
-                    </a:p>
-                  </a:txBody>
-                  <a:tcPr marL="9525" marR="9525" marT="9525" marB="0" anchor="b"/>
-                </a:tc>
-                <a:tc>
-                  <a:txBody>
-                    <a:bodyPr/>
-                    <a:lstStyle/>
-                    <a:p>
-                      <a:pPr algn="ctr" fontAlgn="b"/>
-                      <a:r>
-                        <a:rPr lang="pl-PL" sz="2400" b="0" i="0" u="none" strike="noStrike">
-                          <a:solidFill>
-                            <a:srgbClr val="000000"/>
-                          </a:solidFill>
-                          <a:effectLst/>
-                          <a:latin typeface="Calibri" panose="020F0502020204030204" pitchFamily="34" charset="0"/>
-                        </a:rPr>
-                        <a:t>1</a:t>
-                      </a:r>
-                    </a:p>
-                  </a:txBody>
-                  <a:tcPr marL="9525" marR="9525" marT="9525" marB="0" anchor="b"/>
-                </a:tc>
-                <a:extLst>
-                  <a:ext uri="{0D108BD9-81ED-4DB2-BD59-A6C34878D82A}">
-                    <a16:rowId xmlns:a16="http://schemas.microsoft.com/office/drawing/2014/main" val="1807210762"/>
-                  </a:ext>
-                </a:extLst>
-              </a:tr>
-              <a:tr h="484496">
-                <a:tc>
-                  <a:txBody>
-                    <a:bodyPr/>
-                    <a:lstStyle/>
-                    <a:p>
-                      <a:pPr algn="l" fontAlgn="b"/>
-                      <a:r>
-                        <a:rPr lang="pl-PL" sz="2400" u="none" strike="noStrike" dirty="0">
-                          <a:effectLst/>
-                        </a:rPr>
-                        <a:t>Ilość epok</a:t>
-                      </a:r>
-                      <a:endParaRPr lang="pl-PL" sz="2400" b="0" i="0" u="none" strike="noStrike" dirty="0">
-                        <a:solidFill>
-                          <a:srgbClr val="000000"/>
-                        </a:solidFill>
-                        <a:effectLst/>
-                        <a:latin typeface="Calibri" panose="020F0502020204030204" pitchFamily="34" charset="0"/>
-                      </a:endParaRPr>
-                    </a:p>
-                  </a:txBody>
-                  <a:tcPr marL="9525" marR="9525" marT="9525" marB="0" anchor="b"/>
-                </a:tc>
-                <a:tc>
-                  <a:txBody>
-                    <a:bodyPr/>
-                    <a:lstStyle/>
-                    <a:p>
-                      <a:pPr algn="ctr" fontAlgn="b"/>
-                      <a:r>
-                        <a:rPr lang="pl-PL" sz="2400" b="0" i="0" u="none" strike="noStrike" dirty="0">
-                          <a:solidFill>
-                            <a:srgbClr val="000000"/>
-                          </a:solidFill>
-                          <a:effectLst/>
-                          <a:latin typeface="Calibri" panose="020F0502020204030204" pitchFamily="34" charset="0"/>
-                        </a:rPr>
-                        <a:t>50</a:t>
-                      </a:r>
-                    </a:p>
-                  </a:txBody>
-                  <a:tcPr marL="9525" marR="9525" marT="9525" marB="0" anchor="b"/>
-                </a:tc>
-                <a:extLst>
-                  <a:ext uri="{0D108BD9-81ED-4DB2-BD59-A6C34878D82A}">
-                    <a16:rowId xmlns:a16="http://schemas.microsoft.com/office/drawing/2014/main" val="2340674816"/>
-                  </a:ext>
-                </a:extLst>
-              </a:tr>
-            </a:tbl>
-          </a:graphicData>
-        </a:graphic>
-      </p:graphicFrame>
-    </p:spTree>
-    <p:extLst>
-      <p:ext uri="{BB962C8B-B14F-4D97-AF65-F5344CB8AC3E}">
-        <p14:creationId xmlns:p14="http://schemas.microsoft.com/office/powerpoint/2010/main" val="781573558"/>
-      </p:ext>
-    </p:extLst>
-  </p:cSld>
-  <p:clrMapOvr>
-    <a:masterClrMapping/>
-  </p:clrMapOvr>
+  <mc:AlternateContent xmlns:mc="http://schemas.openxmlformats.org/markup-compatibility/2006">
+    <mc:Choice xmlns:p159="http://schemas.microsoft.com/office/powerpoint/2015/09/main" Requires="p159">
+      <p:transition spd="slow">
+        <p159:morph option="byObject"/>
+      </p:transition>
+    </mc:Choice>
+    <mc:Fallback>
+      <p:transition spd="slow">
+        <p:fade/>
+      </p:transition>
+    </mc:Fallback>
+  </mc:AlternateContent>
 </p:sld>
 </file>
 

</xml_diff>